<commit_message>
Updating lab files to the version of the files that were submitted at the time of respective lab due dates
</commit_message>
<xml_diff>
--- a/Labs/Graph Lab/Graph Lab.pptx
+++ b/Labs/Graph Lab/Graph Lab.pptx
@@ -3760,7 +3760,7 @@
           <a:graphicData uri="http://schemas.openxmlformats.org/presentationml/2006/ole">
             <mc:AlternateContent xmlns:mc="http://schemas.openxmlformats.org/markup-compatibility/2006">
               <mc:Choice xmlns:v="urn:schemas-microsoft-com:vml" Requires="v">
-                <p:oleObj spid="_x0000_s2086" name="Document" r:id="rId3" imgW="5483860" imgH="2470617" progId="Word.Document.8">
+                <p:oleObj spid="_x0000_s2101" name="Document" r:id="rId3" imgW="5483860" imgH="2470617" progId="Word.Document.8">
                   <p:embed/>
                 </p:oleObj>
               </mc:Choice>
@@ -8675,7 +8675,7 @@
         </p:nvSpPr>
         <p:spPr bwMode="auto">
           <a:xfrm>
-            <a:off x="2477429" y="6029740"/>
+            <a:off x="3276602" y="6008149"/>
             <a:ext cx="1295400" cy="348892"/>
           </a:xfrm>
           <a:prstGeom prst="rect">
@@ -8749,7 +8749,7 @@
         </p:nvSpPr>
         <p:spPr bwMode="auto">
           <a:xfrm>
-            <a:off x="2358483" y="6751578"/>
+            <a:off x="3334215" y="6728113"/>
             <a:ext cx="689517" cy="341579"/>
           </a:xfrm>
           <a:prstGeom prst="rect">
@@ -8823,7 +8823,7 @@
         </p:nvSpPr>
         <p:spPr bwMode="auto">
           <a:xfrm>
-            <a:off x="3124200" y="6744265"/>
+            <a:off x="4122231" y="6756792"/>
             <a:ext cx="845636" cy="331150"/>
           </a:xfrm>
           <a:prstGeom prst="rect">
@@ -8897,7 +8897,7 @@
         </p:nvSpPr>
         <p:spPr bwMode="auto">
           <a:xfrm>
-            <a:off x="4060904" y="6751578"/>
+            <a:off x="6144327" y="6751578"/>
             <a:ext cx="689517" cy="348892"/>
           </a:xfrm>
           <a:prstGeom prst="rect">
@@ -8971,7 +8971,7 @@
         </p:nvSpPr>
         <p:spPr bwMode="auto">
           <a:xfrm>
-            <a:off x="2438400" y="7807683"/>
+            <a:off x="3369644" y="7766376"/>
             <a:ext cx="1295400" cy="348892"/>
           </a:xfrm>
           <a:prstGeom prst="rect">
@@ -9045,7 +9045,7 @@
         </p:nvSpPr>
         <p:spPr bwMode="auto">
           <a:xfrm>
-            <a:off x="3869473" y="7797253"/>
+            <a:off x="4879592" y="7763283"/>
             <a:ext cx="1295400" cy="348892"/>
           </a:xfrm>
           <a:prstGeom prst="rect">
@@ -9119,7 +9119,7 @@
         </p:nvSpPr>
         <p:spPr bwMode="auto">
           <a:xfrm>
-            <a:off x="2438400" y="8191915"/>
+            <a:off x="3384513" y="8111611"/>
             <a:ext cx="1295400" cy="382886"/>
           </a:xfrm>
           <a:prstGeom prst="rect">
@@ -9193,7 +9193,7 @@
         </p:nvSpPr>
         <p:spPr bwMode="auto">
           <a:xfrm>
-            <a:off x="3886200" y="8225909"/>
+            <a:off x="4909330" y="8128608"/>
             <a:ext cx="1295400" cy="348892"/>
           </a:xfrm>
           <a:prstGeom prst="rect">
@@ -9267,7 +9267,7 @@
         </p:nvSpPr>
         <p:spPr bwMode="auto">
           <a:xfrm>
-            <a:off x="4841489" y="6751578"/>
+            <a:off x="5105404" y="6751578"/>
             <a:ext cx="903251" cy="348892"/>
           </a:xfrm>
           <a:prstGeom prst="rect">
@@ -9327,6 +9327,1057 @@
           </a:p>
         </p:txBody>
       </p:sp>
+      <p:sp>
+        <p:nvSpPr>
+          <p:cNvPr id="4" name="Rectangle 3">
+            <a:extLst>
+              <a:ext uri="{FF2B5EF4-FFF2-40B4-BE49-F238E27FC236}">
+                <a16:creationId xmlns:a16="http://schemas.microsoft.com/office/drawing/2014/main" id="{F47CF11D-F868-4BBF-B75B-74F762D7597F}"/>
+              </a:ext>
+            </a:extLst>
+          </p:cNvPr>
+          <p:cNvSpPr/>
+          <p:nvPr/>
+        </p:nvSpPr>
+        <p:spPr bwMode="auto">
+          <a:xfrm>
+            <a:off x="2398907" y="6019800"/>
+            <a:ext cx="762000" cy="348892"/>
+          </a:xfrm>
+          <a:prstGeom prst="rect">
+            <a:avLst/>
+          </a:prstGeom>
+          <a:solidFill>
+            <a:schemeClr val="accent1"/>
+          </a:solidFill>
+          <a:ln w="9525" cap="flat" cmpd="sng" algn="ctr">
+            <a:solidFill>
+              <a:schemeClr val="tx1"/>
+            </a:solidFill>
+            <a:prstDash val="solid"/>
+            <a:round/>
+            <a:headEnd type="none" w="med" len="med"/>
+            <a:tailEnd type="none" w="med" len="med"/>
+          </a:ln>
+          <a:effectLst/>
+        </p:spPr>
+        <p:txBody>
+          <a:bodyPr vert="horz" wrap="square" lIns="91440" tIns="45720" rIns="91440" bIns="45720" numCol="1" rtlCol="0" anchor="t" anchorCtr="0" compatLnSpc="1">
+            <a:prstTxWarp prst="textNoShape">
+              <a:avLst/>
+            </a:prstTxWarp>
+          </a:bodyPr>
+          <a:lstStyle/>
+          <a:p>
+            <a:pPr marL="0" marR="0" indent="0" algn="l" defTabSz="914400" rtl="0" eaLnBrk="0" fontAlgn="base" latinLnBrk="0" hangingPunct="0">
+              <a:lnSpc>
+                <a:spcPct val="100000"/>
+              </a:lnSpc>
+              <a:spcBef>
+                <a:spcPct val="0"/>
+              </a:spcBef>
+              <a:spcAft>
+                <a:spcPct val="0"/>
+              </a:spcAft>
+              <a:buClrTx/>
+              <a:buSzTx/>
+              <a:buFontTx/>
+              <a:buNone/>
+              <a:tabLst/>
+            </a:pPr>
+            <a:endParaRPr kumimoji="0" lang="en-US" sz="2400" b="0" i="0" u="none" strike="noStrike" cap="none" normalizeH="0" baseline="0">
+              <a:ln>
+                <a:noFill/>
+              </a:ln>
+              <a:solidFill>
+                <a:schemeClr val="tx1"/>
+              </a:solidFill>
+              <a:effectLst/>
+              <a:latin typeface="Times New Roman" pitchFamily="18" charset="0"/>
+            </a:endParaRPr>
+          </a:p>
+        </p:txBody>
+      </p:sp>
+      <p:sp>
+        <p:nvSpPr>
+          <p:cNvPr id="31" name="Rectangle 30">
+            <a:extLst>
+              <a:ext uri="{FF2B5EF4-FFF2-40B4-BE49-F238E27FC236}">
+                <a16:creationId xmlns:a16="http://schemas.microsoft.com/office/drawing/2014/main" id="{2EB52925-6513-41F7-8E90-32A36A31539A}"/>
+              </a:ext>
+            </a:extLst>
+          </p:cNvPr>
+          <p:cNvSpPr/>
+          <p:nvPr/>
+        </p:nvSpPr>
+        <p:spPr bwMode="auto">
+          <a:xfrm>
+            <a:off x="2398907" y="6368692"/>
+            <a:ext cx="762000" cy="348892"/>
+          </a:xfrm>
+          <a:prstGeom prst="rect">
+            <a:avLst/>
+          </a:prstGeom>
+          <a:solidFill>
+            <a:schemeClr val="accent1"/>
+          </a:solidFill>
+          <a:ln w="9525" cap="flat" cmpd="sng" algn="ctr">
+            <a:solidFill>
+              <a:schemeClr val="tx1"/>
+            </a:solidFill>
+            <a:prstDash val="solid"/>
+            <a:round/>
+            <a:headEnd type="none" w="med" len="med"/>
+            <a:tailEnd type="none" w="med" len="med"/>
+          </a:ln>
+          <a:effectLst/>
+        </p:spPr>
+        <p:txBody>
+          <a:bodyPr vert="horz" wrap="square" lIns="91440" tIns="45720" rIns="91440" bIns="45720" numCol="1" rtlCol="0" anchor="t" anchorCtr="0" compatLnSpc="1">
+            <a:prstTxWarp prst="textNoShape">
+              <a:avLst/>
+            </a:prstTxWarp>
+          </a:bodyPr>
+          <a:lstStyle/>
+          <a:p>
+            <a:pPr marL="0" marR="0" indent="0" algn="l" defTabSz="914400" rtl="0" eaLnBrk="0" fontAlgn="base" latinLnBrk="0" hangingPunct="0">
+              <a:lnSpc>
+                <a:spcPct val="100000"/>
+              </a:lnSpc>
+              <a:spcBef>
+                <a:spcPct val="0"/>
+              </a:spcBef>
+              <a:spcAft>
+                <a:spcPct val="0"/>
+              </a:spcAft>
+              <a:buClrTx/>
+              <a:buSzTx/>
+              <a:buFontTx/>
+              <a:buNone/>
+              <a:tabLst/>
+            </a:pPr>
+            <a:endParaRPr kumimoji="0" lang="en-US" sz="2400" b="0" i="0" u="none" strike="noStrike" cap="none" normalizeH="0" baseline="0">
+              <a:ln>
+                <a:noFill/>
+              </a:ln>
+              <a:solidFill>
+                <a:schemeClr val="tx1"/>
+              </a:solidFill>
+              <a:effectLst/>
+              <a:latin typeface="Times New Roman" pitchFamily="18" charset="0"/>
+            </a:endParaRPr>
+          </a:p>
+        </p:txBody>
+      </p:sp>
+      <p:sp>
+        <p:nvSpPr>
+          <p:cNvPr id="32" name="Rectangle 31">
+            <a:extLst>
+              <a:ext uri="{FF2B5EF4-FFF2-40B4-BE49-F238E27FC236}">
+                <a16:creationId xmlns:a16="http://schemas.microsoft.com/office/drawing/2014/main" id="{57090A1C-720D-4E02-A38E-5E0234EE33D6}"/>
+              </a:ext>
+            </a:extLst>
+          </p:cNvPr>
+          <p:cNvSpPr/>
+          <p:nvPr/>
+        </p:nvSpPr>
+        <p:spPr bwMode="auto">
+          <a:xfrm>
+            <a:off x="2398907" y="6717584"/>
+            <a:ext cx="762000" cy="348892"/>
+          </a:xfrm>
+          <a:prstGeom prst="rect">
+            <a:avLst/>
+          </a:prstGeom>
+          <a:solidFill>
+            <a:schemeClr val="accent1"/>
+          </a:solidFill>
+          <a:ln w="9525" cap="flat" cmpd="sng" algn="ctr">
+            <a:solidFill>
+              <a:schemeClr val="tx1"/>
+            </a:solidFill>
+            <a:prstDash val="solid"/>
+            <a:round/>
+            <a:headEnd type="none" w="med" len="med"/>
+            <a:tailEnd type="none" w="med" len="med"/>
+          </a:ln>
+          <a:effectLst/>
+        </p:spPr>
+        <p:txBody>
+          <a:bodyPr vert="horz" wrap="square" lIns="91440" tIns="45720" rIns="91440" bIns="45720" numCol="1" rtlCol="0" anchor="t" anchorCtr="0" compatLnSpc="1">
+            <a:prstTxWarp prst="textNoShape">
+              <a:avLst/>
+            </a:prstTxWarp>
+          </a:bodyPr>
+          <a:lstStyle/>
+          <a:p>
+            <a:pPr marL="0" marR="0" indent="0" algn="l" defTabSz="914400" rtl="0" eaLnBrk="0" fontAlgn="base" latinLnBrk="0" hangingPunct="0">
+              <a:lnSpc>
+                <a:spcPct val="100000"/>
+              </a:lnSpc>
+              <a:spcBef>
+                <a:spcPct val="0"/>
+              </a:spcBef>
+              <a:spcAft>
+                <a:spcPct val="0"/>
+              </a:spcAft>
+              <a:buClrTx/>
+              <a:buSzTx/>
+              <a:buFontTx/>
+              <a:buNone/>
+              <a:tabLst/>
+            </a:pPr>
+            <a:endParaRPr kumimoji="0" lang="en-US" sz="2400" b="0" i="0" u="none" strike="noStrike" cap="none" normalizeH="0" baseline="0">
+              <a:ln>
+                <a:noFill/>
+              </a:ln>
+              <a:solidFill>
+                <a:schemeClr val="tx1"/>
+              </a:solidFill>
+              <a:effectLst/>
+              <a:latin typeface="Times New Roman" pitchFamily="18" charset="0"/>
+            </a:endParaRPr>
+          </a:p>
+        </p:txBody>
+      </p:sp>
+      <p:sp>
+        <p:nvSpPr>
+          <p:cNvPr id="33" name="Rectangle 32">
+            <a:extLst>
+              <a:ext uri="{FF2B5EF4-FFF2-40B4-BE49-F238E27FC236}">
+                <a16:creationId xmlns:a16="http://schemas.microsoft.com/office/drawing/2014/main" id="{E9F471EF-D882-42D1-A2B1-FA8D07D2295F}"/>
+              </a:ext>
+            </a:extLst>
+          </p:cNvPr>
+          <p:cNvSpPr/>
+          <p:nvPr/>
+        </p:nvSpPr>
+        <p:spPr bwMode="auto">
+          <a:xfrm>
+            <a:off x="2393096" y="7063447"/>
+            <a:ext cx="762000" cy="348892"/>
+          </a:xfrm>
+          <a:prstGeom prst="rect">
+            <a:avLst/>
+          </a:prstGeom>
+          <a:solidFill>
+            <a:schemeClr val="accent1"/>
+          </a:solidFill>
+          <a:ln w="9525" cap="flat" cmpd="sng" algn="ctr">
+            <a:solidFill>
+              <a:schemeClr val="tx1"/>
+            </a:solidFill>
+            <a:prstDash val="solid"/>
+            <a:round/>
+            <a:headEnd type="none" w="med" len="med"/>
+            <a:tailEnd type="none" w="med" len="med"/>
+          </a:ln>
+          <a:effectLst/>
+        </p:spPr>
+        <p:txBody>
+          <a:bodyPr vert="horz" wrap="square" lIns="91440" tIns="45720" rIns="91440" bIns="45720" numCol="1" rtlCol="0" anchor="t" anchorCtr="0" compatLnSpc="1">
+            <a:prstTxWarp prst="textNoShape">
+              <a:avLst/>
+            </a:prstTxWarp>
+          </a:bodyPr>
+          <a:lstStyle/>
+          <a:p>
+            <a:pPr marL="0" marR="0" indent="0" algn="l" defTabSz="914400" rtl="0" eaLnBrk="0" fontAlgn="base" latinLnBrk="0" hangingPunct="0">
+              <a:lnSpc>
+                <a:spcPct val="100000"/>
+              </a:lnSpc>
+              <a:spcBef>
+                <a:spcPct val="0"/>
+              </a:spcBef>
+              <a:spcAft>
+                <a:spcPct val="0"/>
+              </a:spcAft>
+              <a:buClrTx/>
+              <a:buSzTx/>
+              <a:buFontTx/>
+              <a:buNone/>
+              <a:tabLst/>
+            </a:pPr>
+            <a:endParaRPr kumimoji="0" lang="en-US" sz="2400" b="0" i="0" u="none" strike="noStrike" cap="none" normalizeH="0" baseline="0">
+              <a:ln>
+                <a:noFill/>
+              </a:ln>
+              <a:solidFill>
+                <a:schemeClr val="tx1"/>
+              </a:solidFill>
+              <a:effectLst/>
+              <a:latin typeface="Times New Roman" pitchFamily="18" charset="0"/>
+            </a:endParaRPr>
+          </a:p>
+        </p:txBody>
+      </p:sp>
+      <p:sp>
+        <p:nvSpPr>
+          <p:cNvPr id="34" name="Rectangle 33">
+            <a:extLst>
+              <a:ext uri="{FF2B5EF4-FFF2-40B4-BE49-F238E27FC236}">
+                <a16:creationId xmlns:a16="http://schemas.microsoft.com/office/drawing/2014/main" id="{B9759119-850B-4BB3-8720-E2DB5AF908C7}"/>
+              </a:ext>
+            </a:extLst>
+          </p:cNvPr>
+          <p:cNvSpPr/>
+          <p:nvPr/>
+        </p:nvSpPr>
+        <p:spPr bwMode="auto">
+          <a:xfrm>
+            <a:off x="2393096" y="7409310"/>
+            <a:ext cx="762000" cy="348892"/>
+          </a:xfrm>
+          <a:prstGeom prst="rect">
+            <a:avLst/>
+          </a:prstGeom>
+          <a:solidFill>
+            <a:schemeClr val="accent1"/>
+          </a:solidFill>
+          <a:ln w="9525" cap="flat" cmpd="sng" algn="ctr">
+            <a:solidFill>
+              <a:schemeClr val="tx1"/>
+            </a:solidFill>
+            <a:prstDash val="solid"/>
+            <a:round/>
+            <a:headEnd type="none" w="med" len="med"/>
+            <a:tailEnd type="none" w="med" len="med"/>
+          </a:ln>
+          <a:effectLst/>
+        </p:spPr>
+        <p:txBody>
+          <a:bodyPr vert="horz" wrap="square" lIns="91440" tIns="45720" rIns="91440" bIns="45720" numCol="1" rtlCol="0" anchor="t" anchorCtr="0" compatLnSpc="1">
+            <a:prstTxWarp prst="textNoShape">
+              <a:avLst/>
+            </a:prstTxWarp>
+          </a:bodyPr>
+          <a:lstStyle/>
+          <a:p>
+            <a:pPr marL="0" marR="0" indent="0" algn="l" defTabSz="914400" rtl="0" eaLnBrk="0" fontAlgn="base" latinLnBrk="0" hangingPunct="0">
+              <a:lnSpc>
+                <a:spcPct val="100000"/>
+              </a:lnSpc>
+              <a:spcBef>
+                <a:spcPct val="0"/>
+              </a:spcBef>
+              <a:spcAft>
+                <a:spcPct val="0"/>
+              </a:spcAft>
+              <a:buClrTx/>
+              <a:buSzTx/>
+              <a:buFontTx/>
+              <a:buNone/>
+              <a:tabLst/>
+            </a:pPr>
+            <a:endParaRPr kumimoji="0" lang="en-US" sz="2400" b="0" i="0" u="none" strike="noStrike" cap="none" normalizeH="0" baseline="0">
+              <a:ln>
+                <a:noFill/>
+              </a:ln>
+              <a:solidFill>
+                <a:schemeClr val="tx1"/>
+              </a:solidFill>
+              <a:effectLst/>
+              <a:latin typeface="Times New Roman" pitchFamily="18" charset="0"/>
+            </a:endParaRPr>
+          </a:p>
+        </p:txBody>
+      </p:sp>
+      <p:sp>
+        <p:nvSpPr>
+          <p:cNvPr id="35" name="Rectangle 34">
+            <a:extLst>
+              <a:ext uri="{FF2B5EF4-FFF2-40B4-BE49-F238E27FC236}">
+                <a16:creationId xmlns:a16="http://schemas.microsoft.com/office/drawing/2014/main" id="{DC6154F4-E634-4163-9EAD-D95793C1A290}"/>
+              </a:ext>
+            </a:extLst>
+          </p:cNvPr>
+          <p:cNvSpPr/>
+          <p:nvPr/>
+        </p:nvSpPr>
+        <p:spPr bwMode="auto">
+          <a:xfrm>
+            <a:off x="2393096" y="7769860"/>
+            <a:ext cx="762000" cy="348892"/>
+          </a:xfrm>
+          <a:prstGeom prst="rect">
+            <a:avLst/>
+          </a:prstGeom>
+          <a:solidFill>
+            <a:schemeClr val="accent1"/>
+          </a:solidFill>
+          <a:ln w="9525" cap="flat" cmpd="sng" algn="ctr">
+            <a:solidFill>
+              <a:schemeClr val="tx1"/>
+            </a:solidFill>
+            <a:prstDash val="solid"/>
+            <a:round/>
+            <a:headEnd type="none" w="med" len="med"/>
+            <a:tailEnd type="none" w="med" len="med"/>
+          </a:ln>
+          <a:effectLst/>
+        </p:spPr>
+        <p:txBody>
+          <a:bodyPr vert="horz" wrap="square" lIns="91440" tIns="45720" rIns="91440" bIns="45720" numCol="1" rtlCol="0" anchor="t" anchorCtr="0" compatLnSpc="1">
+            <a:prstTxWarp prst="textNoShape">
+              <a:avLst/>
+            </a:prstTxWarp>
+          </a:bodyPr>
+          <a:lstStyle/>
+          <a:p>
+            <a:pPr marL="0" marR="0" indent="0" algn="l" defTabSz="914400" rtl="0" eaLnBrk="0" fontAlgn="base" latinLnBrk="0" hangingPunct="0">
+              <a:lnSpc>
+                <a:spcPct val="100000"/>
+              </a:lnSpc>
+              <a:spcBef>
+                <a:spcPct val="0"/>
+              </a:spcBef>
+              <a:spcAft>
+                <a:spcPct val="0"/>
+              </a:spcAft>
+              <a:buClrTx/>
+              <a:buSzTx/>
+              <a:buFontTx/>
+              <a:buNone/>
+              <a:tabLst/>
+            </a:pPr>
+            <a:endParaRPr kumimoji="0" lang="en-US" sz="2400" b="0" i="0" u="none" strike="noStrike" cap="none" normalizeH="0" baseline="0">
+              <a:ln>
+                <a:noFill/>
+              </a:ln>
+              <a:solidFill>
+                <a:schemeClr val="tx1"/>
+              </a:solidFill>
+              <a:effectLst/>
+              <a:latin typeface="Times New Roman" pitchFamily="18" charset="0"/>
+            </a:endParaRPr>
+          </a:p>
+        </p:txBody>
+      </p:sp>
+      <p:sp>
+        <p:nvSpPr>
+          <p:cNvPr id="36" name="Rectangle 35">
+            <a:extLst>
+              <a:ext uri="{FF2B5EF4-FFF2-40B4-BE49-F238E27FC236}">
+                <a16:creationId xmlns:a16="http://schemas.microsoft.com/office/drawing/2014/main" id="{D51E6784-C1A9-49BB-8955-047DBEE5F332}"/>
+              </a:ext>
+            </a:extLst>
+          </p:cNvPr>
+          <p:cNvSpPr/>
+          <p:nvPr/>
+        </p:nvSpPr>
+        <p:spPr bwMode="auto">
+          <a:xfrm>
+            <a:off x="2393096" y="8116569"/>
+            <a:ext cx="762000" cy="348892"/>
+          </a:xfrm>
+          <a:prstGeom prst="rect">
+            <a:avLst/>
+          </a:prstGeom>
+          <a:solidFill>
+            <a:schemeClr val="accent1"/>
+          </a:solidFill>
+          <a:ln w="9525" cap="flat" cmpd="sng" algn="ctr">
+            <a:solidFill>
+              <a:schemeClr val="tx1"/>
+            </a:solidFill>
+            <a:prstDash val="solid"/>
+            <a:round/>
+            <a:headEnd type="none" w="med" len="med"/>
+            <a:tailEnd type="none" w="med" len="med"/>
+          </a:ln>
+          <a:effectLst/>
+        </p:spPr>
+        <p:txBody>
+          <a:bodyPr vert="horz" wrap="square" lIns="91440" tIns="45720" rIns="91440" bIns="45720" numCol="1" rtlCol="0" anchor="t" anchorCtr="0" compatLnSpc="1">
+            <a:prstTxWarp prst="textNoShape">
+              <a:avLst/>
+            </a:prstTxWarp>
+          </a:bodyPr>
+          <a:lstStyle/>
+          <a:p>
+            <a:pPr marL="0" marR="0" indent="0" algn="l" defTabSz="914400" rtl="0" eaLnBrk="0" fontAlgn="base" latinLnBrk="0" hangingPunct="0">
+              <a:lnSpc>
+                <a:spcPct val="100000"/>
+              </a:lnSpc>
+              <a:spcBef>
+                <a:spcPct val="0"/>
+              </a:spcBef>
+              <a:spcAft>
+                <a:spcPct val="0"/>
+              </a:spcAft>
+              <a:buClrTx/>
+              <a:buSzTx/>
+              <a:buFontTx/>
+              <a:buNone/>
+              <a:tabLst/>
+            </a:pPr>
+            <a:endParaRPr kumimoji="0" lang="en-US" sz="2400" b="0" i="0" u="none" strike="noStrike" cap="none" normalizeH="0" baseline="0">
+              <a:ln>
+                <a:noFill/>
+              </a:ln>
+              <a:solidFill>
+                <a:schemeClr val="tx1"/>
+              </a:solidFill>
+              <a:effectLst/>
+              <a:latin typeface="Times New Roman" pitchFamily="18" charset="0"/>
+            </a:endParaRPr>
+          </a:p>
+        </p:txBody>
+      </p:sp>
+      <p:cxnSp>
+        <p:nvCxnSpPr>
+          <p:cNvPr id="11" name="Straight Arrow Connector 10">
+            <a:extLst>
+              <a:ext uri="{FF2B5EF4-FFF2-40B4-BE49-F238E27FC236}">
+                <a16:creationId xmlns:a16="http://schemas.microsoft.com/office/drawing/2014/main" id="{5ED40E7B-DDAE-4A37-8CC1-4294ABF29ED9}"/>
+              </a:ext>
+            </a:extLst>
+          </p:cNvPr>
+          <p:cNvCxnSpPr>
+            <a:cxnSpLocks/>
+            <a:endCxn id="23" idx="1"/>
+          </p:cNvCxnSpPr>
+          <p:nvPr/>
+        </p:nvCxnSpPr>
+        <p:spPr bwMode="auto">
+          <a:xfrm flipV="1">
+            <a:off x="2748651" y="6898903"/>
+            <a:ext cx="585564" cy="6176"/>
+          </a:xfrm>
+          <a:prstGeom prst="straightConnector1">
+            <a:avLst/>
+          </a:prstGeom>
+          <a:solidFill>
+            <a:schemeClr val="accent1"/>
+          </a:solidFill>
+          <a:ln w="9525" cap="flat" cmpd="sng" algn="ctr">
+            <a:solidFill>
+              <a:schemeClr val="tx1"/>
+            </a:solidFill>
+            <a:prstDash val="solid"/>
+            <a:round/>
+            <a:headEnd type="none" w="med" len="med"/>
+            <a:tailEnd type="triangle"/>
+          </a:ln>
+          <a:effectLst/>
+        </p:spPr>
+      </p:cxnSp>
+      <p:cxnSp>
+        <p:nvCxnSpPr>
+          <p:cNvPr id="15" name="Straight Arrow Connector 14">
+            <a:extLst>
+              <a:ext uri="{FF2B5EF4-FFF2-40B4-BE49-F238E27FC236}">
+                <a16:creationId xmlns:a16="http://schemas.microsoft.com/office/drawing/2014/main" id="{2EA29B5E-3814-4AE8-B885-46D0536CC2A3}"/>
+              </a:ext>
+            </a:extLst>
+          </p:cNvPr>
+          <p:cNvCxnSpPr>
+            <a:stCxn id="23" idx="3"/>
+            <a:endCxn id="24" idx="1"/>
+          </p:cNvCxnSpPr>
+          <p:nvPr/>
+        </p:nvCxnSpPr>
+        <p:spPr bwMode="auto">
+          <a:xfrm>
+            <a:off x="4023732" y="6898903"/>
+            <a:ext cx="98499" cy="23464"/>
+          </a:xfrm>
+          <a:prstGeom prst="straightConnector1">
+            <a:avLst/>
+          </a:prstGeom>
+          <a:solidFill>
+            <a:schemeClr val="accent1"/>
+          </a:solidFill>
+          <a:ln w="9525" cap="flat" cmpd="sng" algn="ctr">
+            <a:solidFill>
+              <a:schemeClr val="tx1"/>
+            </a:solidFill>
+            <a:prstDash val="solid"/>
+            <a:round/>
+            <a:headEnd type="none" w="med" len="med"/>
+            <a:tailEnd type="triangle"/>
+          </a:ln>
+          <a:effectLst/>
+        </p:spPr>
+      </p:cxnSp>
+      <p:cxnSp>
+        <p:nvCxnSpPr>
+          <p:cNvPr id="41" name="Straight Arrow Connector 40">
+            <a:extLst>
+              <a:ext uri="{FF2B5EF4-FFF2-40B4-BE49-F238E27FC236}">
+                <a16:creationId xmlns:a16="http://schemas.microsoft.com/office/drawing/2014/main" id="{526B0D1C-3CE5-4F74-A671-5DE1E6E588F8}"/>
+              </a:ext>
+            </a:extLst>
+          </p:cNvPr>
+          <p:cNvCxnSpPr>
+            <a:cxnSpLocks/>
+            <a:endCxn id="22" idx="1"/>
+          </p:cNvCxnSpPr>
+          <p:nvPr/>
+        </p:nvCxnSpPr>
+        <p:spPr bwMode="auto">
+          <a:xfrm flipV="1">
+            <a:off x="2777409" y="6182595"/>
+            <a:ext cx="499193" cy="6917"/>
+          </a:xfrm>
+          <a:prstGeom prst="straightConnector1">
+            <a:avLst/>
+          </a:prstGeom>
+          <a:solidFill>
+            <a:schemeClr val="accent1"/>
+          </a:solidFill>
+          <a:ln w="9525" cap="flat" cmpd="sng" algn="ctr">
+            <a:solidFill>
+              <a:schemeClr val="tx1"/>
+            </a:solidFill>
+            <a:prstDash val="solid"/>
+            <a:round/>
+            <a:headEnd type="none" w="med" len="med"/>
+            <a:tailEnd type="triangle"/>
+          </a:ln>
+          <a:effectLst/>
+        </p:spPr>
+      </p:cxnSp>
+      <p:cxnSp>
+        <p:nvCxnSpPr>
+          <p:cNvPr id="43" name="Straight Arrow Connector 42">
+            <a:extLst>
+              <a:ext uri="{FF2B5EF4-FFF2-40B4-BE49-F238E27FC236}">
+                <a16:creationId xmlns:a16="http://schemas.microsoft.com/office/drawing/2014/main" id="{2F768D91-059F-49F9-8C79-B5CDF37D1B95}"/>
+              </a:ext>
+            </a:extLst>
+          </p:cNvPr>
+          <p:cNvCxnSpPr>
+            <a:cxnSpLocks/>
+            <a:endCxn id="26" idx="1"/>
+          </p:cNvCxnSpPr>
+          <p:nvPr/>
+        </p:nvCxnSpPr>
+        <p:spPr bwMode="auto">
+          <a:xfrm>
+            <a:off x="2720548" y="7940822"/>
+            <a:ext cx="649096" cy="0"/>
+          </a:xfrm>
+          <a:prstGeom prst="straightConnector1">
+            <a:avLst/>
+          </a:prstGeom>
+          <a:solidFill>
+            <a:schemeClr val="accent1"/>
+          </a:solidFill>
+          <a:ln w="9525" cap="flat" cmpd="sng" algn="ctr">
+            <a:solidFill>
+              <a:schemeClr val="tx1"/>
+            </a:solidFill>
+            <a:prstDash val="solid"/>
+            <a:round/>
+            <a:headEnd type="none" w="med" len="med"/>
+            <a:tailEnd type="triangle"/>
+          </a:ln>
+          <a:effectLst/>
+        </p:spPr>
+      </p:cxnSp>
+      <p:cxnSp>
+        <p:nvCxnSpPr>
+          <p:cNvPr id="45" name="Straight Arrow Connector 44">
+            <a:extLst>
+              <a:ext uri="{FF2B5EF4-FFF2-40B4-BE49-F238E27FC236}">
+                <a16:creationId xmlns:a16="http://schemas.microsoft.com/office/drawing/2014/main" id="{B7AB787F-DD30-4CCF-AD92-BAEF8595A60B}"/>
+              </a:ext>
+            </a:extLst>
+          </p:cNvPr>
+          <p:cNvCxnSpPr>
+            <a:cxnSpLocks/>
+            <a:endCxn id="28" idx="1"/>
+          </p:cNvCxnSpPr>
+          <p:nvPr/>
+        </p:nvCxnSpPr>
+        <p:spPr bwMode="auto">
+          <a:xfrm>
+            <a:off x="2720548" y="8297888"/>
+            <a:ext cx="663965" cy="5166"/>
+          </a:xfrm>
+          <a:prstGeom prst="straightConnector1">
+            <a:avLst/>
+          </a:prstGeom>
+          <a:solidFill>
+            <a:schemeClr val="accent1"/>
+          </a:solidFill>
+          <a:ln w="9525" cap="flat" cmpd="sng" algn="ctr">
+            <a:solidFill>
+              <a:schemeClr val="tx1"/>
+            </a:solidFill>
+            <a:prstDash val="solid"/>
+            <a:round/>
+            <a:headEnd type="none" w="med" len="med"/>
+            <a:tailEnd type="triangle"/>
+          </a:ln>
+          <a:effectLst/>
+        </p:spPr>
+      </p:cxnSp>
+      <p:cxnSp>
+        <p:nvCxnSpPr>
+          <p:cNvPr id="47" name="Straight Arrow Connector 46">
+            <a:extLst>
+              <a:ext uri="{FF2B5EF4-FFF2-40B4-BE49-F238E27FC236}">
+                <a16:creationId xmlns:a16="http://schemas.microsoft.com/office/drawing/2014/main" id="{5EB56464-6ADB-4B53-A943-3C9C71FADA3D}"/>
+              </a:ext>
+            </a:extLst>
+          </p:cNvPr>
+          <p:cNvCxnSpPr>
+            <a:stCxn id="28" idx="3"/>
+            <a:endCxn id="29" idx="1"/>
+          </p:cNvCxnSpPr>
+          <p:nvPr/>
+        </p:nvCxnSpPr>
+        <p:spPr bwMode="auto">
+          <a:xfrm>
+            <a:off x="4679913" y="8303054"/>
+            <a:ext cx="229417" cy="0"/>
+          </a:xfrm>
+          <a:prstGeom prst="straightConnector1">
+            <a:avLst/>
+          </a:prstGeom>
+          <a:solidFill>
+            <a:schemeClr val="accent1"/>
+          </a:solidFill>
+          <a:ln w="9525" cap="flat" cmpd="sng" algn="ctr">
+            <a:solidFill>
+              <a:schemeClr val="tx1"/>
+            </a:solidFill>
+            <a:prstDash val="solid"/>
+            <a:round/>
+            <a:headEnd type="none" w="med" len="med"/>
+            <a:tailEnd type="triangle"/>
+          </a:ln>
+          <a:effectLst/>
+        </p:spPr>
+      </p:cxnSp>
+      <p:cxnSp>
+        <p:nvCxnSpPr>
+          <p:cNvPr id="49" name="Straight Arrow Connector 48">
+            <a:extLst>
+              <a:ext uri="{FF2B5EF4-FFF2-40B4-BE49-F238E27FC236}">
+                <a16:creationId xmlns:a16="http://schemas.microsoft.com/office/drawing/2014/main" id="{956DC432-529F-4252-9EFE-6AC86ADA891C}"/>
+              </a:ext>
+            </a:extLst>
+          </p:cNvPr>
+          <p:cNvCxnSpPr>
+            <a:stCxn id="26" idx="3"/>
+            <a:endCxn id="27" idx="1"/>
+          </p:cNvCxnSpPr>
+          <p:nvPr/>
+        </p:nvCxnSpPr>
+        <p:spPr bwMode="auto">
+          <a:xfrm flipV="1">
+            <a:off x="4665044" y="7937729"/>
+            <a:ext cx="214548" cy="3093"/>
+          </a:xfrm>
+          <a:prstGeom prst="straightConnector1">
+            <a:avLst/>
+          </a:prstGeom>
+          <a:solidFill>
+            <a:schemeClr val="accent1"/>
+          </a:solidFill>
+          <a:ln w="9525" cap="flat" cmpd="sng" algn="ctr">
+            <a:solidFill>
+              <a:schemeClr val="tx1"/>
+            </a:solidFill>
+            <a:prstDash val="solid"/>
+            <a:round/>
+            <a:headEnd type="none" w="med" len="med"/>
+            <a:tailEnd type="triangle"/>
+          </a:ln>
+          <a:effectLst/>
+        </p:spPr>
+      </p:cxnSp>
+      <p:cxnSp>
+        <p:nvCxnSpPr>
+          <p:cNvPr id="62" name="Straight Connector 61">
+            <a:extLst>
+              <a:ext uri="{FF2B5EF4-FFF2-40B4-BE49-F238E27FC236}">
+                <a16:creationId xmlns:a16="http://schemas.microsoft.com/office/drawing/2014/main" id="{565293D9-A87B-4ED2-A58C-480C95889081}"/>
+              </a:ext>
+            </a:extLst>
+          </p:cNvPr>
+          <p:cNvCxnSpPr/>
+          <p:nvPr/>
+        </p:nvCxnSpPr>
+        <p:spPr bwMode="auto">
+          <a:xfrm>
+            <a:off x="2774096" y="7583756"/>
+            <a:ext cx="502506" cy="0"/>
+          </a:xfrm>
+          <a:prstGeom prst="line">
+            <a:avLst/>
+          </a:prstGeom>
+          <a:solidFill>
+            <a:schemeClr val="accent1"/>
+          </a:solidFill>
+          <a:ln w="9525" cap="flat" cmpd="sng" algn="ctr">
+            <a:solidFill>
+              <a:schemeClr val="tx1"/>
+            </a:solidFill>
+            <a:prstDash val="solid"/>
+            <a:round/>
+            <a:headEnd type="none" w="med" len="med"/>
+            <a:tailEnd type="none" w="med" len="med"/>
+          </a:ln>
+          <a:effectLst/>
+        </p:spPr>
+      </p:cxnSp>
+      <p:cxnSp>
+        <p:nvCxnSpPr>
+          <p:cNvPr id="3072" name="Straight Connector 3071">
+            <a:extLst>
+              <a:ext uri="{FF2B5EF4-FFF2-40B4-BE49-F238E27FC236}">
+                <a16:creationId xmlns:a16="http://schemas.microsoft.com/office/drawing/2014/main" id="{679574EA-88CA-406A-BD4A-44F90AFB30F6}"/>
+              </a:ext>
+            </a:extLst>
+          </p:cNvPr>
+          <p:cNvCxnSpPr/>
+          <p:nvPr/>
+        </p:nvCxnSpPr>
+        <p:spPr bwMode="auto">
+          <a:xfrm>
+            <a:off x="2720548" y="7237893"/>
+            <a:ext cx="556054" cy="0"/>
+          </a:xfrm>
+          <a:prstGeom prst="line">
+            <a:avLst/>
+          </a:prstGeom>
+          <a:solidFill>
+            <a:schemeClr val="accent1"/>
+          </a:solidFill>
+          <a:ln w="9525" cap="flat" cmpd="sng" algn="ctr">
+            <a:solidFill>
+              <a:schemeClr val="tx1"/>
+            </a:solidFill>
+            <a:prstDash val="solid"/>
+            <a:round/>
+            <a:headEnd type="none" w="med" len="med"/>
+            <a:tailEnd type="none" w="med" len="med"/>
+          </a:ln>
+          <a:effectLst/>
+        </p:spPr>
+      </p:cxnSp>
+      <p:cxnSp>
+        <p:nvCxnSpPr>
+          <p:cNvPr id="3076" name="Straight Connector 3075">
+            <a:extLst>
+              <a:ext uri="{FF2B5EF4-FFF2-40B4-BE49-F238E27FC236}">
+                <a16:creationId xmlns:a16="http://schemas.microsoft.com/office/drawing/2014/main" id="{1B4DF1A4-AA22-48BA-B069-E051E7C1FC48}"/>
+              </a:ext>
+            </a:extLst>
+          </p:cNvPr>
+          <p:cNvCxnSpPr/>
+          <p:nvPr/>
+        </p:nvCxnSpPr>
+        <p:spPr bwMode="auto">
+          <a:xfrm>
+            <a:off x="2774096" y="6543138"/>
+            <a:ext cx="502506" cy="0"/>
+          </a:xfrm>
+          <a:prstGeom prst="line">
+            <a:avLst/>
+          </a:prstGeom>
+          <a:solidFill>
+            <a:schemeClr val="accent1"/>
+          </a:solidFill>
+          <a:ln w="9525" cap="flat" cmpd="sng" algn="ctr">
+            <a:solidFill>
+              <a:schemeClr val="tx1"/>
+            </a:solidFill>
+            <a:prstDash val="solid"/>
+            <a:round/>
+            <a:headEnd type="none" w="med" len="med"/>
+            <a:tailEnd type="none" w="med" len="med"/>
+          </a:ln>
+          <a:effectLst/>
+        </p:spPr>
+      </p:cxnSp>
+      <p:cxnSp>
+        <p:nvCxnSpPr>
+          <p:cNvPr id="3080" name="Straight Arrow Connector 3079">
+            <a:extLst>
+              <a:ext uri="{FF2B5EF4-FFF2-40B4-BE49-F238E27FC236}">
+                <a16:creationId xmlns:a16="http://schemas.microsoft.com/office/drawing/2014/main" id="{5ACF020C-DE2A-4708-80FA-3FA22A4C378E}"/>
+              </a:ext>
+            </a:extLst>
+          </p:cNvPr>
+          <p:cNvCxnSpPr>
+            <a:cxnSpLocks/>
+          </p:cNvCxnSpPr>
+          <p:nvPr/>
+        </p:nvCxnSpPr>
+        <p:spPr bwMode="auto">
+          <a:xfrm>
+            <a:off x="3276602" y="6543138"/>
+            <a:ext cx="0" cy="208440"/>
+          </a:xfrm>
+          <a:prstGeom prst="straightConnector1">
+            <a:avLst/>
+          </a:prstGeom>
+          <a:solidFill>
+            <a:schemeClr val="accent1"/>
+          </a:solidFill>
+          <a:ln w="9525" cap="flat" cmpd="sng" algn="ctr">
+            <a:solidFill>
+              <a:schemeClr val="tx1"/>
+            </a:solidFill>
+            <a:prstDash val="solid"/>
+            <a:round/>
+            <a:headEnd type="none" w="med" len="med"/>
+            <a:tailEnd type="triangle"/>
+          </a:ln>
+          <a:effectLst/>
+        </p:spPr>
+      </p:cxnSp>
+      <p:cxnSp>
+        <p:nvCxnSpPr>
+          <p:cNvPr id="3084" name="Straight Arrow Connector 3083">
+            <a:extLst>
+              <a:ext uri="{FF2B5EF4-FFF2-40B4-BE49-F238E27FC236}">
+                <a16:creationId xmlns:a16="http://schemas.microsoft.com/office/drawing/2014/main" id="{387331FB-F898-437D-9D26-1848B66F6246}"/>
+              </a:ext>
+            </a:extLst>
+          </p:cNvPr>
+          <p:cNvCxnSpPr/>
+          <p:nvPr/>
+        </p:nvCxnSpPr>
+        <p:spPr bwMode="auto">
+          <a:xfrm>
+            <a:off x="3276602" y="7237893"/>
+            <a:ext cx="0" cy="211469"/>
+          </a:xfrm>
+          <a:prstGeom prst="straightConnector1">
+            <a:avLst/>
+          </a:prstGeom>
+          <a:solidFill>
+            <a:schemeClr val="accent1"/>
+          </a:solidFill>
+          <a:ln w="9525" cap="flat" cmpd="sng" algn="ctr">
+            <a:solidFill>
+              <a:schemeClr val="tx1"/>
+            </a:solidFill>
+            <a:prstDash val="solid"/>
+            <a:round/>
+            <a:headEnd type="none" w="med" len="med"/>
+            <a:tailEnd type="triangle"/>
+          </a:ln>
+          <a:effectLst/>
+        </p:spPr>
+      </p:cxnSp>
+      <p:cxnSp>
+        <p:nvCxnSpPr>
+          <p:cNvPr id="3086" name="Straight Arrow Connector 3085">
+            <a:extLst>
+              <a:ext uri="{FF2B5EF4-FFF2-40B4-BE49-F238E27FC236}">
+                <a16:creationId xmlns:a16="http://schemas.microsoft.com/office/drawing/2014/main" id="{12318D91-3F2D-4EF3-9093-D039DD5D6E08}"/>
+              </a:ext>
+            </a:extLst>
+          </p:cNvPr>
+          <p:cNvCxnSpPr/>
+          <p:nvPr/>
+        </p:nvCxnSpPr>
+        <p:spPr bwMode="auto">
+          <a:xfrm>
+            <a:off x="3276602" y="7583756"/>
+            <a:ext cx="0" cy="213497"/>
+          </a:xfrm>
+          <a:prstGeom prst="straightConnector1">
+            <a:avLst/>
+          </a:prstGeom>
+          <a:solidFill>
+            <a:schemeClr val="accent1"/>
+          </a:solidFill>
+          <a:ln w="9525" cap="flat" cmpd="sng" algn="ctr">
+            <a:solidFill>
+              <a:schemeClr val="tx1"/>
+            </a:solidFill>
+            <a:prstDash val="solid"/>
+            <a:round/>
+            <a:headEnd type="none" w="med" len="med"/>
+            <a:tailEnd type="triangle"/>
+          </a:ln>
+          <a:effectLst/>
+        </p:spPr>
+      </p:cxnSp>
+      <p:cxnSp>
+        <p:nvCxnSpPr>
+          <p:cNvPr id="3092" name="Straight Arrow Connector 3091">
+            <a:extLst>
+              <a:ext uri="{FF2B5EF4-FFF2-40B4-BE49-F238E27FC236}">
+                <a16:creationId xmlns:a16="http://schemas.microsoft.com/office/drawing/2014/main" id="{AC29651F-40CB-4EAC-AD2E-6D43EDA7F2C4}"/>
+              </a:ext>
+            </a:extLst>
+          </p:cNvPr>
+          <p:cNvCxnSpPr>
+            <a:stCxn id="24" idx="3"/>
+            <a:endCxn id="30" idx="1"/>
+          </p:cNvCxnSpPr>
+          <p:nvPr/>
+        </p:nvCxnSpPr>
+        <p:spPr bwMode="auto">
+          <a:xfrm>
+            <a:off x="4967867" y="6922367"/>
+            <a:ext cx="137537" cy="3657"/>
+          </a:xfrm>
+          <a:prstGeom prst="straightConnector1">
+            <a:avLst/>
+          </a:prstGeom>
+          <a:solidFill>
+            <a:schemeClr val="accent1"/>
+          </a:solidFill>
+          <a:ln w="9525" cap="flat" cmpd="sng" algn="ctr">
+            <a:solidFill>
+              <a:schemeClr val="tx1"/>
+            </a:solidFill>
+            <a:prstDash val="solid"/>
+            <a:round/>
+            <a:headEnd type="none" w="med" len="med"/>
+            <a:tailEnd type="triangle"/>
+          </a:ln>
+          <a:effectLst/>
+        </p:spPr>
+      </p:cxnSp>
+      <p:cxnSp>
+        <p:nvCxnSpPr>
+          <p:cNvPr id="3094" name="Straight Arrow Connector 3093">
+            <a:extLst>
+              <a:ext uri="{FF2B5EF4-FFF2-40B4-BE49-F238E27FC236}">
+                <a16:creationId xmlns:a16="http://schemas.microsoft.com/office/drawing/2014/main" id="{77427541-6E34-446B-97F9-D92D707D5553}"/>
+              </a:ext>
+            </a:extLst>
+          </p:cNvPr>
+          <p:cNvCxnSpPr>
+            <a:stCxn id="30" idx="3"/>
+            <a:endCxn id="25" idx="1"/>
+          </p:cNvCxnSpPr>
+          <p:nvPr/>
+        </p:nvCxnSpPr>
+        <p:spPr bwMode="auto">
+          <a:xfrm>
+            <a:off x="6008655" y="6926024"/>
+            <a:ext cx="135672" cy="0"/>
+          </a:xfrm>
+          <a:prstGeom prst="straightConnector1">
+            <a:avLst/>
+          </a:prstGeom>
+          <a:solidFill>
+            <a:schemeClr val="accent1"/>
+          </a:solidFill>
+          <a:ln w="9525" cap="flat" cmpd="sng" algn="ctr">
+            <a:solidFill>
+              <a:schemeClr val="tx1"/>
+            </a:solidFill>
+            <a:prstDash val="solid"/>
+            <a:round/>
+            <a:headEnd type="none" w="med" len="med"/>
+            <a:tailEnd type="triangle"/>
+          </a:ln>
+          <a:effectLst/>
+        </p:spPr>
+      </p:cxnSp>
     </p:spTree>
   </p:cSld>
   <p:clrMapOvr>
@@ -10412,216 +11463,6 @@
           </a:p>
         </p:txBody>
       </p:sp>
-      <p:cxnSp>
-        <p:nvCxnSpPr>
-          <p:cNvPr id="3" name="Straight Arrow Connector 2">
-            <a:extLst>
-              <a:ext uri="{FF2B5EF4-FFF2-40B4-BE49-F238E27FC236}">
-                <a16:creationId xmlns:a16="http://schemas.microsoft.com/office/drawing/2014/main" id="{083D9B3A-863D-4D19-8A66-9F1AF6BAC0DF}"/>
-              </a:ext>
-            </a:extLst>
-          </p:cNvPr>
-          <p:cNvCxnSpPr/>
-          <p:nvPr/>
-        </p:nvCxnSpPr>
-        <p:spPr bwMode="auto">
-          <a:xfrm flipH="1" flipV="1">
-            <a:off x="4953000" y="1600200"/>
-            <a:ext cx="228600" cy="838200"/>
-          </a:xfrm>
-          <a:prstGeom prst="straightConnector1">
-            <a:avLst/>
-          </a:prstGeom>
-          <a:solidFill>
-            <a:schemeClr val="accent1"/>
-          </a:solidFill>
-          <a:ln w="9525" cap="flat" cmpd="sng" algn="ctr">
-            <a:solidFill>
-              <a:srgbClr val="0070C0"/>
-            </a:solidFill>
-            <a:prstDash val="solid"/>
-            <a:round/>
-            <a:headEnd type="none" w="med" len="med"/>
-            <a:tailEnd type="triangle"/>
-          </a:ln>
-          <a:effectLst/>
-        </p:spPr>
-      </p:cxnSp>
-      <p:cxnSp>
-        <p:nvCxnSpPr>
-          <p:cNvPr id="5" name="Straight Arrow Connector 4">
-            <a:extLst>
-              <a:ext uri="{FF2B5EF4-FFF2-40B4-BE49-F238E27FC236}">
-                <a16:creationId xmlns:a16="http://schemas.microsoft.com/office/drawing/2014/main" id="{768B2EA6-AF66-42FA-9F3D-1C87A0A40848}"/>
-              </a:ext>
-            </a:extLst>
-          </p:cNvPr>
-          <p:cNvCxnSpPr/>
-          <p:nvPr/>
-        </p:nvCxnSpPr>
-        <p:spPr bwMode="auto">
-          <a:xfrm flipH="1">
-            <a:off x="4114800" y="2819400"/>
-            <a:ext cx="685800" cy="381000"/>
-          </a:xfrm>
-          <a:prstGeom prst="straightConnector1">
-            <a:avLst/>
-          </a:prstGeom>
-          <a:solidFill>
-            <a:schemeClr val="accent1"/>
-          </a:solidFill>
-          <a:ln w="9525" cap="flat" cmpd="sng" algn="ctr">
-            <a:solidFill>
-              <a:srgbClr val="0070C0"/>
-            </a:solidFill>
-            <a:prstDash val="solid"/>
-            <a:round/>
-            <a:headEnd type="none" w="med" len="med"/>
-            <a:tailEnd type="triangle"/>
-          </a:ln>
-          <a:effectLst/>
-        </p:spPr>
-      </p:cxnSp>
-      <p:cxnSp>
-        <p:nvCxnSpPr>
-          <p:cNvPr id="7" name="Straight Arrow Connector 6">
-            <a:extLst>
-              <a:ext uri="{FF2B5EF4-FFF2-40B4-BE49-F238E27FC236}">
-                <a16:creationId xmlns:a16="http://schemas.microsoft.com/office/drawing/2014/main" id="{77161AB8-77AF-4A4F-A9EE-F65E2EC9B7BD}"/>
-              </a:ext>
-            </a:extLst>
-          </p:cNvPr>
-          <p:cNvCxnSpPr/>
-          <p:nvPr/>
-        </p:nvCxnSpPr>
-        <p:spPr bwMode="auto">
-          <a:xfrm flipH="1" flipV="1">
-            <a:off x="3352800" y="838200"/>
-            <a:ext cx="990600" cy="457200"/>
-          </a:xfrm>
-          <a:prstGeom prst="straightConnector1">
-            <a:avLst/>
-          </a:prstGeom>
-          <a:solidFill>
-            <a:schemeClr val="accent1"/>
-          </a:solidFill>
-          <a:ln w="9525" cap="flat" cmpd="sng" algn="ctr">
-            <a:solidFill>
-              <a:srgbClr val="0070C0"/>
-            </a:solidFill>
-            <a:prstDash val="solid"/>
-            <a:round/>
-            <a:headEnd type="none" w="med" len="med"/>
-            <a:tailEnd type="triangle"/>
-          </a:ln>
-          <a:effectLst/>
-        </p:spPr>
-      </p:cxnSp>
-      <p:cxnSp>
-        <p:nvCxnSpPr>
-          <p:cNvPr id="9" name="Straight Arrow Connector 8">
-            <a:extLst>
-              <a:ext uri="{FF2B5EF4-FFF2-40B4-BE49-F238E27FC236}">
-                <a16:creationId xmlns:a16="http://schemas.microsoft.com/office/drawing/2014/main" id="{95D50F70-9E08-449F-93C5-3E5DAEA14AAB}"/>
-              </a:ext>
-            </a:extLst>
-          </p:cNvPr>
-          <p:cNvCxnSpPr/>
-          <p:nvPr/>
-        </p:nvCxnSpPr>
-        <p:spPr bwMode="auto">
-          <a:xfrm flipH="1">
-            <a:off x="1676400" y="914400"/>
-            <a:ext cx="685800" cy="304800"/>
-          </a:xfrm>
-          <a:prstGeom prst="straightConnector1">
-            <a:avLst/>
-          </a:prstGeom>
-          <a:solidFill>
-            <a:schemeClr val="accent1"/>
-          </a:solidFill>
-          <a:ln w="9525" cap="flat" cmpd="sng" algn="ctr">
-            <a:solidFill>
-              <a:srgbClr val="0070C0"/>
-            </a:solidFill>
-            <a:prstDash val="solid"/>
-            <a:round/>
-            <a:headEnd type="none" w="med" len="med"/>
-            <a:tailEnd type="triangle"/>
-          </a:ln>
-          <a:effectLst/>
-        </p:spPr>
-      </p:cxnSp>
-      <p:cxnSp>
-        <p:nvCxnSpPr>
-          <p:cNvPr id="13" name="Straight Arrow Connector 12">
-            <a:extLst>
-              <a:ext uri="{FF2B5EF4-FFF2-40B4-BE49-F238E27FC236}">
-                <a16:creationId xmlns:a16="http://schemas.microsoft.com/office/drawing/2014/main" id="{39107730-AADC-4CB2-B444-664BF6FF5E36}"/>
-              </a:ext>
-            </a:extLst>
-          </p:cNvPr>
-          <p:cNvCxnSpPr/>
-          <p:nvPr/>
-        </p:nvCxnSpPr>
-        <p:spPr bwMode="auto">
-          <a:xfrm>
-            <a:off x="2743200" y="990600"/>
-            <a:ext cx="0" cy="838200"/>
-          </a:xfrm>
-          <a:prstGeom prst="straightConnector1">
-            <a:avLst/>
-          </a:prstGeom>
-          <a:solidFill>
-            <a:schemeClr val="accent1"/>
-          </a:solidFill>
-          <a:ln w="9525" cap="flat" cmpd="sng" algn="ctr">
-            <a:solidFill>
-              <a:srgbClr val="0070C0"/>
-            </a:solidFill>
-            <a:prstDash val="solid"/>
-            <a:round/>
-            <a:headEnd type="none" w="med" len="med"/>
-            <a:tailEnd type="triangle"/>
-          </a:ln>
-          <a:effectLst/>
-        </p:spPr>
-      </p:cxnSp>
-      <p:cxnSp>
-        <p:nvCxnSpPr>
-          <p:cNvPr id="15" name="Straight Arrow Connector 14">
-            <a:extLst>
-              <a:ext uri="{FF2B5EF4-FFF2-40B4-BE49-F238E27FC236}">
-                <a16:creationId xmlns:a16="http://schemas.microsoft.com/office/drawing/2014/main" id="{03C81DE3-E114-4A5B-8645-C708C0D6B3D5}"/>
-              </a:ext>
-            </a:extLst>
-          </p:cNvPr>
-          <p:cNvCxnSpPr/>
-          <p:nvPr/>
-        </p:nvCxnSpPr>
-        <p:spPr bwMode="auto">
-          <a:xfrm flipH="1">
-            <a:off x="1752600" y="1066800"/>
-            <a:ext cx="762000" cy="1905000"/>
-          </a:xfrm>
-          <a:prstGeom prst="straightConnector1">
-            <a:avLst/>
-          </a:prstGeom>
-          <a:solidFill>
-            <a:schemeClr val="accent1"/>
-          </a:solidFill>
-          <a:ln w="9525" cap="flat" cmpd="sng" algn="ctr">
-            <a:solidFill>
-              <a:srgbClr val="0070C0"/>
-            </a:solidFill>
-            <a:prstDash val="solid"/>
-            <a:round/>
-            <a:headEnd type="none" w="med" len="med"/>
-            <a:tailEnd type="triangle"/>
-          </a:ln>
-          <a:effectLst/>
-        </p:spPr>
-      </p:cxnSp>
       <p:sp>
         <p:nvSpPr>
           <p:cNvPr id="16" name="TextBox 15">
@@ -10687,6 +11528,228 @@
           </a:p>
         </p:txBody>
       </p:sp>
+      <p:cxnSp>
+        <p:nvCxnSpPr>
+          <p:cNvPr id="11" name="Straight Connector 10">
+            <a:extLst>
+              <a:ext uri="{FF2B5EF4-FFF2-40B4-BE49-F238E27FC236}">
+                <a16:creationId xmlns:a16="http://schemas.microsoft.com/office/drawing/2014/main" id="{7ED58C13-6505-4CFD-9F13-EF70EB561114}"/>
+              </a:ext>
+            </a:extLst>
+          </p:cNvPr>
+          <p:cNvCxnSpPr>
+            <a:cxnSpLocks/>
+          </p:cNvCxnSpPr>
+          <p:nvPr/>
+        </p:nvCxnSpPr>
+        <p:spPr bwMode="auto">
+          <a:xfrm flipH="1">
+            <a:off x="4191000" y="2819400"/>
+            <a:ext cx="762000" cy="457200"/>
+          </a:xfrm>
+          <a:prstGeom prst="line">
+            <a:avLst/>
+          </a:prstGeom>
+          <a:solidFill>
+            <a:schemeClr val="accent1"/>
+          </a:solidFill>
+          <a:ln w="28575" cap="flat" cmpd="sng" algn="ctr">
+            <a:solidFill>
+              <a:srgbClr val="0070C0"/>
+            </a:solidFill>
+            <a:prstDash val="solid"/>
+            <a:round/>
+            <a:headEnd type="none" w="med" len="med"/>
+            <a:tailEnd type="none" w="med" len="med"/>
+          </a:ln>
+          <a:effectLst/>
+        </p:spPr>
+      </p:cxnSp>
+      <p:cxnSp>
+        <p:nvCxnSpPr>
+          <p:cNvPr id="14" name="Straight Connector 13">
+            <a:extLst>
+              <a:ext uri="{FF2B5EF4-FFF2-40B4-BE49-F238E27FC236}">
+                <a16:creationId xmlns:a16="http://schemas.microsoft.com/office/drawing/2014/main" id="{73835A89-99EE-4546-9345-6BA21D3C98CA}"/>
+              </a:ext>
+            </a:extLst>
+          </p:cNvPr>
+          <p:cNvCxnSpPr>
+            <a:cxnSpLocks/>
+          </p:cNvCxnSpPr>
+          <p:nvPr/>
+        </p:nvCxnSpPr>
+        <p:spPr bwMode="auto">
+          <a:xfrm>
+            <a:off x="4914900" y="1600200"/>
+            <a:ext cx="266700" cy="838200"/>
+          </a:xfrm>
+          <a:prstGeom prst="line">
+            <a:avLst/>
+          </a:prstGeom>
+          <a:solidFill>
+            <a:schemeClr val="accent1"/>
+          </a:solidFill>
+          <a:ln w="28575" cap="flat" cmpd="sng" algn="ctr">
+            <a:solidFill>
+              <a:srgbClr val="0070C0"/>
+            </a:solidFill>
+            <a:prstDash val="solid"/>
+            <a:round/>
+            <a:headEnd type="none" w="med" len="med"/>
+            <a:tailEnd type="none" w="med" len="med"/>
+          </a:ln>
+          <a:effectLst/>
+        </p:spPr>
+      </p:cxnSp>
+      <p:cxnSp>
+        <p:nvCxnSpPr>
+          <p:cNvPr id="17" name="Straight Connector 16">
+            <a:extLst>
+              <a:ext uri="{FF2B5EF4-FFF2-40B4-BE49-F238E27FC236}">
+                <a16:creationId xmlns:a16="http://schemas.microsoft.com/office/drawing/2014/main" id="{9BF29C9F-8357-466F-93FC-6BD024D3E1B4}"/>
+              </a:ext>
+            </a:extLst>
+          </p:cNvPr>
+          <p:cNvCxnSpPr>
+            <a:cxnSpLocks/>
+          </p:cNvCxnSpPr>
+          <p:nvPr/>
+        </p:nvCxnSpPr>
+        <p:spPr bwMode="auto">
+          <a:xfrm flipH="1" flipV="1">
+            <a:off x="3352799" y="824508"/>
+            <a:ext cx="990600" cy="484584"/>
+          </a:xfrm>
+          <a:prstGeom prst="line">
+            <a:avLst/>
+          </a:prstGeom>
+          <a:solidFill>
+            <a:schemeClr val="accent1"/>
+          </a:solidFill>
+          <a:ln w="28575" cap="flat" cmpd="sng" algn="ctr">
+            <a:solidFill>
+              <a:srgbClr val="0070C0"/>
+            </a:solidFill>
+            <a:prstDash val="solid"/>
+            <a:round/>
+            <a:headEnd type="none" w="med" len="med"/>
+            <a:tailEnd type="none" w="med" len="med"/>
+          </a:ln>
+          <a:effectLst/>
+        </p:spPr>
+      </p:cxnSp>
+      <p:cxnSp>
+        <p:nvCxnSpPr>
+          <p:cNvPr id="19" name="Straight Connector 18">
+            <a:extLst>
+              <a:ext uri="{FF2B5EF4-FFF2-40B4-BE49-F238E27FC236}">
+                <a16:creationId xmlns:a16="http://schemas.microsoft.com/office/drawing/2014/main" id="{DC04C3AF-227B-485F-B51E-E21A13783AC5}"/>
+              </a:ext>
+            </a:extLst>
+          </p:cNvPr>
+          <p:cNvCxnSpPr>
+            <a:cxnSpLocks/>
+          </p:cNvCxnSpPr>
+          <p:nvPr/>
+        </p:nvCxnSpPr>
+        <p:spPr bwMode="auto">
+          <a:xfrm flipH="1">
+            <a:off x="1527717" y="902891"/>
+            <a:ext cx="873512" cy="327818"/>
+          </a:xfrm>
+          <a:prstGeom prst="line">
+            <a:avLst/>
+          </a:prstGeom>
+          <a:solidFill>
+            <a:schemeClr val="accent1"/>
+          </a:solidFill>
+          <a:ln w="28575" cap="flat" cmpd="sng" algn="ctr">
+            <a:solidFill>
+              <a:srgbClr val="0070C0"/>
+            </a:solidFill>
+            <a:prstDash val="solid"/>
+            <a:round/>
+            <a:headEnd type="none" w="med" len="med"/>
+            <a:tailEnd type="none" w="med" len="med"/>
+          </a:ln>
+          <a:effectLst/>
+        </p:spPr>
+      </p:cxnSp>
+      <p:cxnSp>
+        <p:nvCxnSpPr>
+          <p:cNvPr id="21" name="Straight Connector 20">
+            <a:extLst>
+              <a:ext uri="{FF2B5EF4-FFF2-40B4-BE49-F238E27FC236}">
+                <a16:creationId xmlns:a16="http://schemas.microsoft.com/office/drawing/2014/main" id="{99FC56AE-7306-4940-B132-E10CD0A079D5}"/>
+              </a:ext>
+            </a:extLst>
+          </p:cNvPr>
+          <p:cNvCxnSpPr>
+            <a:cxnSpLocks/>
+          </p:cNvCxnSpPr>
+          <p:nvPr/>
+        </p:nvCxnSpPr>
+        <p:spPr bwMode="auto">
+          <a:xfrm flipV="1">
+            <a:off x="2743200" y="902891"/>
+            <a:ext cx="0" cy="1002109"/>
+          </a:xfrm>
+          <a:prstGeom prst="line">
+            <a:avLst/>
+          </a:prstGeom>
+          <a:solidFill>
+            <a:schemeClr val="accent1"/>
+          </a:solidFill>
+          <a:ln w="28575" cap="flat" cmpd="sng" algn="ctr">
+            <a:solidFill>
+              <a:srgbClr val="0070C0"/>
+            </a:solidFill>
+            <a:prstDash val="solid"/>
+            <a:round/>
+            <a:headEnd type="none" w="med" len="med"/>
+            <a:tailEnd type="none" w="med" len="med"/>
+          </a:ln>
+          <a:effectLst/>
+        </p:spPr>
+      </p:cxnSp>
+      <p:cxnSp>
+        <p:nvCxnSpPr>
+          <p:cNvPr id="24" name="Straight Connector 23">
+            <a:extLst>
+              <a:ext uri="{FF2B5EF4-FFF2-40B4-BE49-F238E27FC236}">
+                <a16:creationId xmlns:a16="http://schemas.microsoft.com/office/drawing/2014/main" id="{2F1351C4-1FF9-41D5-B866-31911325A3E2}"/>
+              </a:ext>
+            </a:extLst>
+          </p:cNvPr>
+          <p:cNvCxnSpPr>
+            <a:cxnSpLocks/>
+          </p:cNvCxnSpPr>
+          <p:nvPr/>
+        </p:nvCxnSpPr>
+        <p:spPr bwMode="auto">
+          <a:xfrm flipV="1">
+            <a:off x="1752600" y="902891"/>
+            <a:ext cx="812800" cy="2145111"/>
+          </a:xfrm>
+          <a:prstGeom prst="line">
+            <a:avLst/>
+          </a:prstGeom>
+          <a:solidFill>
+            <a:schemeClr val="accent1"/>
+          </a:solidFill>
+          <a:ln w="28575" cap="flat" cmpd="sng" algn="ctr">
+            <a:solidFill>
+              <a:srgbClr val="0070C0"/>
+            </a:solidFill>
+            <a:prstDash val="solid"/>
+            <a:round/>
+            <a:headEnd type="none" w="med" len="med"/>
+            <a:tailEnd type="none" w="med" len="med"/>
+          </a:ln>
+          <a:effectLst/>
+        </p:spPr>
+      </p:cxnSp>
     </p:spTree>
   </p:cSld>
   <p:clrMapOvr>
@@ -11052,80 +12115,6 @@
           </a:extLst>
         </p:spPr>
       </p:pic>
-      <p:cxnSp>
-        <p:nvCxnSpPr>
-          <p:cNvPr id="3" name="Straight Arrow Connector 2">
-            <a:extLst>
-              <a:ext uri="{FF2B5EF4-FFF2-40B4-BE49-F238E27FC236}">
-                <a16:creationId xmlns:a16="http://schemas.microsoft.com/office/drawing/2014/main" id="{B9C8F208-BC38-488D-9B0E-A78A00DAD931}"/>
-              </a:ext>
-            </a:extLst>
-          </p:cNvPr>
-          <p:cNvCxnSpPr>
-            <a:cxnSpLocks/>
-          </p:cNvCxnSpPr>
-          <p:nvPr/>
-        </p:nvCxnSpPr>
-        <p:spPr bwMode="auto">
-          <a:xfrm>
-            <a:off x="2802390" y="1600200"/>
-            <a:ext cx="1312410" cy="0"/>
-          </a:xfrm>
-          <a:prstGeom prst="straightConnector1">
-            <a:avLst/>
-          </a:prstGeom>
-          <a:solidFill>
-            <a:schemeClr val="accent1"/>
-          </a:solidFill>
-          <a:ln w="9525" cap="flat" cmpd="sng" algn="ctr">
-            <a:solidFill>
-              <a:srgbClr val="C00000"/>
-            </a:solidFill>
-            <a:prstDash val="lgDash"/>
-            <a:round/>
-            <a:headEnd type="none" w="med" len="med"/>
-            <a:tailEnd type="triangle"/>
-          </a:ln>
-          <a:effectLst/>
-        </p:spPr>
-      </p:cxnSp>
-      <p:cxnSp>
-        <p:nvCxnSpPr>
-          <p:cNvPr id="12" name="Straight Arrow Connector 11">
-            <a:extLst>
-              <a:ext uri="{FF2B5EF4-FFF2-40B4-BE49-F238E27FC236}">
-                <a16:creationId xmlns:a16="http://schemas.microsoft.com/office/drawing/2014/main" id="{C9654FED-1A61-4111-8315-8B93F2823DE6}"/>
-              </a:ext>
-            </a:extLst>
-          </p:cNvPr>
-          <p:cNvCxnSpPr>
-            <a:cxnSpLocks/>
-          </p:cNvCxnSpPr>
-          <p:nvPr/>
-        </p:nvCxnSpPr>
-        <p:spPr bwMode="auto">
-          <a:xfrm>
-            <a:off x="2514600" y="1752600"/>
-            <a:ext cx="0" cy="838200"/>
-          </a:xfrm>
-          <a:prstGeom prst="straightConnector1">
-            <a:avLst/>
-          </a:prstGeom>
-          <a:solidFill>
-            <a:schemeClr val="accent1"/>
-          </a:solidFill>
-          <a:ln w="9525" cap="flat" cmpd="sng" algn="ctr">
-            <a:solidFill>
-              <a:srgbClr val="C00000"/>
-            </a:solidFill>
-            <a:prstDash val="lgDash"/>
-            <a:round/>
-            <a:headEnd type="none" w="med" len="med"/>
-            <a:tailEnd type="triangle"/>
-          </a:ln>
-          <a:effectLst/>
-        </p:spPr>
-      </p:cxnSp>
       <p:pic>
         <p:nvPicPr>
           <p:cNvPr id="18" name="Picture 5">
@@ -11266,366 +12255,6 @@
           </a:extLst>
         </p:spPr>
       </p:pic>
-      <p:cxnSp>
-        <p:nvCxnSpPr>
-          <p:cNvPr id="17" name="Straight Arrow Connector 16">
-            <a:extLst>
-              <a:ext uri="{FF2B5EF4-FFF2-40B4-BE49-F238E27FC236}">
-                <a16:creationId xmlns:a16="http://schemas.microsoft.com/office/drawing/2014/main" id="{F0A62CF2-30B5-4F32-80A0-2A0DEA880706}"/>
-              </a:ext>
-            </a:extLst>
-          </p:cNvPr>
-          <p:cNvCxnSpPr/>
-          <p:nvPr/>
-        </p:nvCxnSpPr>
-        <p:spPr bwMode="auto">
-          <a:xfrm>
-            <a:off x="4726955" y="1795869"/>
-            <a:ext cx="0" cy="684489"/>
-          </a:xfrm>
-          <a:prstGeom prst="straightConnector1">
-            <a:avLst/>
-          </a:prstGeom>
-          <a:solidFill>
-            <a:schemeClr val="accent1"/>
-          </a:solidFill>
-          <a:ln w="9525" cap="flat" cmpd="sng" algn="ctr">
-            <a:solidFill>
-              <a:srgbClr val="0070C0"/>
-            </a:solidFill>
-            <a:prstDash val="solid"/>
-            <a:round/>
-            <a:headEnd type="none" w="med" len="med"/>
-            <a:tailEnd type="triangle"/>
-          </a:ln>
-          <a:effectLst/>
-        </p:spPr>
-      </p:cxnSp>
-      <p:cxnSp>
-        <p:nvCxnSpPr>
-          <p:cNvPr id="23" name="Straight Arrow Connector 22">
-            <a:extLst>
-              <a:ext uri="{FF2B5EF4-FFF2-40B4-BE49-F238E27FC236}">
-                <a16:creationId xmlns:a16="http://schemas.microsoft.com/office/drawing/2014/main" id="{4A92F22A-AC5B-4AD0-9CC0-18E50B243A53}"/>
-              </a:ext>
-            </a:extLst>
-          </p:cNvPr>
-          <p:cNvCxnSpPr/>
-          <p:nvPr/>
-        </p:nvCxnSpPr>
-        <p:spPr bwMode="auto">
-          <a:xfrm>
-            <a:off x="5031755" y="1658975"/>
-            <a:ext cx="1029949" cy="0"/>
-          </a:xfrm>
-          <a:prstGeom prst="straightConnector1">
-            <a:avLst/>
-          </a:prstGeom>
-          <a:solidFill>
-            <a:schemeClr val="accent1"/>
-          </a:solidFill>
-          <a:ln w="9525" cap="flat" cmpd="sng" algn="ctr">
-            <a:solidFill>
-              <a:srgbClr val="C00000"/>
-            </a:solidFill>
-            <a:prstDash val="lgDash"/>
-            <a:round/>
-            <a:headEnd type="none" w="med" len="med"/>
-            <a:tailEnd type="triangle"/>
-          </a:ln>
-          <a:effectLst/>
-        </p:spPr>
-      </p:cxnSp>
-      <p:cxnSp>
-        <p:nvCxnSpPr>
-          <p:cNvPr id="25" name="Straight Arrow Connector 24">
-            <a:extLst>
-              <a:ext uri="{FF2B5EF4-FFF2-40B4-BE49-F238E27FC236}">
-                <a16:creationId xmlns:a16="http://schemas.microsoft.com/office/drawing/2014/main" id="{A52E9AF0-DE7B-432A-B2C4-2372991B125D}"/>
-              </a:ext>
-            </a:extLst>
-          </p:cNvPr>
-          <p:cNvCxnSpPr>
-            <a:cxnSpLocks/>
-          </p:cNvCxnSpPr>
-          <p:nvPr/>
-        </p:nvCxnSpPr>
-        <p:spPr bwMode="auto">
-          <a:xfrm flipV="1">
-            <a:off x="4914900" y="2171700"/>
-            <a:ext cx="533400" cy="378329"/>
-          </a:xfrm>
-          <a:prstGeom prst="straightConnector1">
-            <a:avLst/>
-          </a:prstGeom>
-          <a:solidFill>
-            <a:schemeClr val="accent1"/>
-          </a:solidFill>
-          <a:ln w="9525" cap="flat" cmpd="sng" algn="ctr">
-            <a:solidFill>
-              <a:srgbClr val="C00000"/>
-            </a:solidFill>
-            <a:prstDash val="lgDash"/>
-            <a:round/>
-            <a:headEnd type="none" w="med" len="med"/>
-            <a:tailEnd type="triangle"/>
-          </a:ln>
-          <a:effectLst/>
-        </p:spPr>
-      </p:cxnSp>
-      <p:cxnSp>
-        <p:nvCxnSpPr>
-          <p:cNvPr id="27" name="Straight Arrow Connector 26">
-            <a:extLst>
-              <a:ext uri="{FF2B5EF4-FFF2-40B4-BE49-F238E27FC236}">
-                <a16:creationId xmlns:a16="http://schemas.microsoft.com/office/drawing/2014/main" id="{A6B39483-DA64-4D34-B6DB-3B8D88CA4F28}"/>
-              </a:ext>
-            </a:extLst>
-          </p:cNvPr>
-          <p:cNvCxnSpPr/>
-          <p:nvPr/>
-        </p:nvCxnSpPr>
-        <p:spPr bwMode="auto">
-          <a:xfrm>
-            <a:off x="4979297" y="2819400"/>
-            <a:ext cx="496546" cy="0"/>
-          </a:xfrm>
-          <a:prstGeom prst="straightConnector1">
-            <a:avLst/>
-          </a:prstGeom>
-          <a:solidFill>
-            <a:schemeClr val="accent1"/>
-          </a:solidFill>
-          <a:ln w="9525" cap="flat" cmpd="sng" algn="ctr">
-            <a:solidFill>
-              <a:srgbClr val="C00000"/>
-            </a:solidFill>
-            <a:prstDash val="lgDash"/>
-            <a:round/>
-            <a:headEnd type="none" w="med" len="med"/>
-            <a:tailEnd type="triangle"/>
-          </a:ln>
-          <a:effectLst/>
-        </p:spPr>
-      </p:cxnSp>
-      <p:cxnSp>
-        <p:nvCxnSpPr>
-          <p:cNvPr id="29" name="Straight Arrow Connector 28">
-            <a:extLst>
-              <a:ext uri="{FF2B5EF4-FFF2-40B4-BE49-F238E27FC236}">
-                <a16:creationId xmlns:a16="http://schemas.microsoft.com/office/drawing/2014/main" id="{E7D5DCF9-4915-4E06-8A74-9B9B4C81A4FD}"/>
-              </a:ext>
-            </a:extLst>
-          </p:cNvPr>
-          <p:cNvCxnSpPr/>
-          <p:nvPr/>
-        </p:nvCxnSpPr>
-        <p:spPr bwMode="auto">
-          <a:xfrm>
-            <a:off x="329624" y="3404541"/>
-            <a:ext cx="0" cy="808712"/>
-          </a:xfrm>
-          <a:prstGeom prst="straightConnector1">
-            <a:avLst/>
-          </a:prstGeom>
-          <a:solidFill>
-            <a:schemeClr val="accent1"/>
-          </a:solidFill>
-          <a:ln w="9525" cap="flat" cmpd="sng" algn="ctr">
-            <a:solidFill>
-              <a:srgbClr val="0070C0"/>
-            </a:solidFill>
-            <a:prstDash val="solid"/>
-            <a:round/>
-            <a:headEnd type="none" w="med" len="med"/>
-            <a:tailEnd type="triangle"/>
-          </a:ln>
-          <a:effectLst/>
-        </p:spPr>
-      </p:cxnSp>
-      <p:cxnSp>
-        <p:nvCxnSpPr>
-          <p:cNvPr id="31" name="Straight Arrow Connector 30">
-            <a:extLst>
-              <a:ext uri="{FF2B5EF4-FFF2-40B4-BE49-F238E27FC236}">
-                <a16:creationId xmlns:a16="http://schemas.microsoft.com/office/drawing/2014/main" id="{9708CDEA-4116-4FD7-A59D-91C16E76C5FE}"/>
-              </a:ext>
-            </a:extLst>
-          </p:cNvPr>
-          <p:cNvCxnSpPr/>
-          <p:nvPr/>
-        </p:nvCxnSpPr>
-        <p:spPr bwMode="auto">
-          <a:xfrm>
-            <a:off x="533400" y="3276600"/>
-            <a:ext cx="1275704" cy="0"/>
-          </a:xfrm>
-          <a:prstGeom prst="straightConnector1">
-            <a:avLst/>
-          </a:prstGeom>
-          <a:solidFill>
-            <a:schemeClr val="accent1"/>
-          </a:solidFill>
-          <a:ln w="9525" cap="flat" cmpd="sng" algn="ctr">
-            <a:solidFill>
-              <a:srgbClr val="C00000"/>
-            </a:solidFill>
-            <a:prstDash val="lgDash"/>
-            <a:round/>
-            <a:headEnd type="none" w="med" len="med"/>
-            <a:tailEnd type="triangle"/>
-          </a:ln>
-          <a:effectLst/>
-        </p:spPr>
-      </p:cxnSp>
-      <p:cxnSp>
-        <p:nvCxnSpPr>
-          <p:cNvPr id="2049" name="Straight Arrow Connector 2048">
-            <a:extLst>
-              <a:ext uri="{FF2B5EF4-FFF2-40B4-BE49-F238E27FC236}">
-                <a16:creationId xmlns:a16="http://schemas.microsoft.com/office/drawing/2014/main" id="{E7FCF9E5-C6BE-49CF-A483-632E24C9EF41}"/>
-              </a:ext>
-            </a:extLst>
-          </p:cNvPr>
-          <p:cNvCxnSpPr>
-            <a:cxnSpLocks/>
-          </p:cNvCxnSpPr>
-          <p:nvPr/>
-        </p:nvCxnSpPr>
-        <p:spPr bwMode="auto">
-          <a:xfrm flipV="1">
-            <a:off x="496648" y="3798721"/>
-            <a:ext cx="561216" cy="443126"/>
-          </a:xfrm>
-          <a:prstGeom prst="straightConnector1">
-            <a:avLst/>
-          </a:prstGeom>
-          <a:solidFill>
-            <a:schemeClr val="accent1"/>
-          </a:solidFill>
-          <a:ln w="9525" cap="flat" cmpd="sng" algn="ctr">
-            <a:solidFill>
-              <a:srgbClr val="0070C0"/>
-            </a:solidFill>
-            <a:prstDash val="solid"/>
-            <a:round/>
-            <a:headEnd type="none" w="med" len="med"/>
-            <a:tailEnd type="triangle"/>
-          </a:ln>
-          <a:effectLst/>
-        </p:spPr>
-      </p:cxnSp>
-      <p:cxnSp>
-        <p:nvCxnSpPr>
-          <p:cNvPr id="2053" name="Straight Arrow Connector 2052">
-            <a:extLst>
-              <a:ext uri="{FF2B5EF4-FFF2-40B4-BE49-F238E27FC236}">
-                <a16:creationId xmlns:a16="http://schemas.microsoft.com/office/drawing/2014/main" id="{4885394F-2CF4-46D3-A24E-EA8A92123085}"/>
-              </a:ext>
-            </a:extLst>
-          </p:cNvPr>
-          <p:cNvCxnSpPr>
-            <a:cxnSpLocks/>
-          </p:cNvCxnSpPr>
-          <p:nvPr/>
-        </p:nvCxnSpPr>
-        <p:spPr bwMode="auto">
-          <a:xfrm>
-            <a:off x="533400" y="4329830"/>
-            <a:ext cx="524464" cy="0"/>
-          </a:xfrm>
-          <a:prstGeom prst="straightConnector1">
-            <a:avLst/>
-          </a:prstGeom>
-          <a:solidFill>
-            <a:schemeClr val="accent1"/>
-          </a:solidFill>
-          <a:ln w="9525" cap="flat" cmpd="sng" algn="ctr">
-            <a:solidFill>
-              <a:srgbClr val="C00000"/>
-            </a:solidFill>
-            <a:prstDash val="lgDash"/>
-            <a:round/>
-            <a:headEnd type="none" w="med" len="med"/>
-            <a:tailEnd type="triangle"/>
-          </a:ln>
-          <a:effectLst/>
-        </p:spPr>
-      </p:cxnSp>
-      <p:cxnSp>
-        <p:nvCxnSpPr>
-          <p:cNvPr id="2058" name="Straight Arrow Connector 2057">
-            <a:extLst>
-              <a:ext uri="{FF2B5EF4-FFF2-40B4-BE49-F238E27FC236}">
-                <a16:creationId xmlns:a16="http://schemas.microsoft.com/office/drawing/2014/main" id="{BB84560A-1C4F-4E87-9EAB-E5F88D50B8B1}"/>
-              </a:ext>
-            </a:extLst>
-          </p:cNvPr>
-          <p:cNvCxnSpPr>
-            <a:cxnSpLocks/>
-          </p:cNvCxnSpPr>
-          <p:nvPr/>
-        </p:nvCxnSpPr>
-        <p:spPr bwMode="auto">
-          <a:xfrm flipV="1">
-            <a:off x="1275704" y="3276600"/>
-            <a:ext cx="493398" cy="395749"/>
-          </a:xfrm>
-          <a:prstGeom prst="straightConnector1">
-            <a:avLst/>
-          </a:prstGeom>
-          <a:solidFill>
-            <a:schemeClr val="accent1"/>
-          </a:solidFill>
-          <a:ln w="9525" cap="flat" cmpd="sng" algn="ctr">
-            <a:solidFill>
-              <a:srgbClr val="C00000"/>
-            </a:solidFill>
-            <a:prstDash val="lgDash"/>
-            <a:round/>
-            <a:headEnd type="none" w="med" len="med"/>
-            <a:tailEnd type="triangle"/>
-          </a:ln>
-          <a:effectLst/>
-        </p:spPr>
-      </p:cxnSp>
-      <p:cxnSp>
-        <p:nvCxnSpPr>
-          <p:cNvPr id="2062" name="Straight Arrow Connector 2061">
-            <a:extLst>
-              <a:ext uri="{FF2B5EF4-FFF2-40B4-BE49-F238E27FC236}">
-                <a16:creationId xmlns:a16="http://schemas.microsoft.com/office/drawing/2014/main" id="{6FD86147-7C8E-4C59-BA19-DBE8D9C6BB04}"/>
-              </a:ext>
-            </a:extLst>
-          </p:cNvPr>
-          <p:cNvCxnSpPr>
-            <a:cxnSpLocks/>
-          </p:cNvCxnSpPr>
-          <p:nvPr/>
-        </p:nvCxnSpPr>
-        <p:spPr bwMode="auto">
-          <a:xfrm>
-            <a:off x="1143116" y="3902036"/>
-            <a:ext cx="0" cy="339811"/>
-          </a:xfrm>
-          <a:prstGeom prst="straightConnector1">
-            <a:avLst/>
-          </a:prstGeom>
-          <a:solidFill>
-            <a:schemeClr val="accent1"/>
-          </a:solidFill>
-          <a:ln w="9525" cap="flat" cmpd="sng" algn="ctr">
-            <a:solidFill>
-              <a:srgbClr val="C00000"/>
-            </a:solidFill>
-            <a:prstDash val="lgDash"/>
-            <a:round/>
-            <a:headEnd type="none" w="med" len="med"/>
-            <a:tailEnd type="triangle"/>
-          </a:ln>
-          <a:effectLst/>
-        </p:spPr>
-      </p:cxnSp>
       <p:pic>
         <p:nvPicPr>
           <p:cNvPr id="64" name="Picture 5">
@@ -11696,222 +12325,6 @@
           </a:extLst>
         </p:spPr>
       </p:pic>
-      <p:cxnSp>
-        <p:nvCxnSpPr>
-          <p:cNvPr id="66" name="Straight Arrow Connector 65">
-            <a:extLst>
-              <a:ext uri="{FF2B5EF4-FFF2-40B4-BE49-F238E27FC236}">
-                <a16:creationId xmlns:a16="http://schemas.microsoft.com/office/drawing/2014/main" id="{DAE1F19C-9A6F-486D-9FE4-1EF6881F63E1}"/>
-              </a:ext>
-            </a:extLst>
-          </p:cNvPr>
-          <p:cNvCxnSpPr/>
-          <p:nvPr/>
-        </p:nvCxnSpPr>
-        <p:spPr bwMode="auto">
-          <a:xfrm>
-            <a:off x="2441307" y="3382167"/>
-            <a:ext cx="0" cy="859680"/>
-          </a:xfrm>
-          <a:prstGeom prst="straightConnector1">
-            <a:avLst/>
-          </a:prstGeom>
-          <a:solidFill>
-            <a:schemeClr val="accent1"/>
-          </a:solidFill>
-          <a:ln w="9525" cap="flat" cmpd="sng" algn="ctr">
-            <a:solidFill>
-              <a:srgbClr val="0070C0"/>
-            </a:solidFill>
-            <a:prstDash val="solid"/>
-            <a:round/>
-            <a:headEnd type="none" w="med" len="med"/>
-            <a:tailEnd type="triangle"/>
-          </a:ln>
-          <a:effectLst/>
-        </p:spPr>
-      </p:cxnSp>
-      <p:cxnSp>
-        <p:nvCxnSpPr>
-          <p:cNvPr id="67" name="Straight Arrow Connector 66">
-            <a:extLst>
-              <a:ext uri="{FF2B5EF4-FFF2-40B4-BE49-F238E27FC236}">
-                <a16:creationId xmlns:a16="http://schemas.microsoft.com/office/drawing/2014/main" id="{C298E202-E2F1-4BA6-9250-6952738F96AA}"/>
-              </a:ext>
-            </a:extLst>
-          </p:cNvPr>
-          <p:cNvCxnSpPr>
-            <a:cxnSpLocks/>
-          </p:cNvCxnSpPr>
-          <p:nvPr/>
-        </p:nvCxnSpPr>
-        <p:spPr bwMode="auto">
-          <a:xfrm flipV="1">
-            <a:off x="2533540" y="3798721"/>
-            <a:ext cx="585536" cy="443127"/>
-          </a:xfrm>
-          <a:prstGeom prst="straightConnector1">
-            <a:avLst/>
-          </a:prstGeom>
-          <a:solidFill>
-            <a:schemeClr val="accent1"/>
-          </a:solidFill>
-          <a:ln w="9525" cap="flat" cmpd="sng" algn="ctr">
-            <a:solidFill>
-              <a:srgbClr val="0070C0"/>
-            </a:solidFill>
-            <a:prstDash val="solid"/>
-            <a:round/>
-            <a:headEnd type="none" w="med" len="med"/>
-            <a:tailEnd type="triangle"/>
-          </a:ln>
-          <a:effectLst/>
-        </p:spPr>
-      </p:cxnSp>
-      <p:cxnSp>
-        <p:nvCxnSpPr>
-          <p:cNvPr id="68" name="Straight Arrow Connector 67">
-            <a:extLst>
-              <a:ext uri="{FF2B5EF4-FFF2-40B4-BE49-F238E27FC236}">
-                <a16:creationId xmlns:a16="http://schemas.microsoft.com/office/drawing/2014/main" id="{1460875C-689F-46C3-AB03-7618E1E7D72C}"/>
-              </a:ext>
-            </a:extLst>
-          </p:cNvPr>
-          <p:cNvCxnSpPr>
-            <a:cxnSpLocks/>
-          </p:cNvCxnSpPr>
-          <p:nvPr/>
-        </p:nvCxnSpPr>
-        <p:spPr bwMode="auto">
-          <a:xfrm>
-            <a:off x="2682216" y="4347662"/>
-            <a:ext cx="436860" cy="0"/>
-          </a:xfrm>
-          <a:prstGeom prst="straightConnector1">
-            <a:avLst/>
-          </a:prstGeom>
-          <a:solidFill>
-            <a:schemeClr val="accent1"/>
-          </a:solidFill>
-          <a:ln w="9525" cap="flat" cmpd="sng" algn="ctr">
-            <a:solidFill>
-              <a:srgbClr val="C00000"/>
-            </a:solidFill>
-            <a:prstDash val="lgDash"/>
-            <a:round/>
-            <a:headEnd type="none" w="med" len="med"/>
-            <a:tailEnd type="triangle"/>
-          </a:ln>
-          <a:effectLst/>
-        </p:spPr>
-      </p:cxnSp>
-      <p:cxnSp>
-        <p:nvCxnSpPr>
-          <p:cNvPr id="69" name="Straight Arrow Connector 68">
-            <a:extLst>
-              <a:ext uri="{FF2B5EF4-FFF2-40B4-BE49-F238E27FC236}">
-                <a16:creationId xmlns:a16="http://schemas.microsoft.com/office/drawing/2014/main" id="{38D8FD51-6AD6-465B-854D-3D645CBA8A09}"/>
-              </a:ext>
-            </a:extLst>
-          </p:cNvPr>
-          <p:cNvCxnSpPr>
-            <a:cxnSpLocks/>
-          </p:cNvCxnSpPr>
-          <p:nvPr/>
-        </p:nvCxnSpPr>
-        <p:spPr bwMode="auto">
-          <a:xfrm flipV="1">
-            <a:off x="3414623" y="3249790"/>
-            <a:ext cx="529683" cy="388738"/>
-          </a:xfrm>
-          <a:prstGeom prst="straightConnector1">
-            <a:avLst/>
-          </a:prstGeom>
-          <a:solidFill>
-            <a:schemeClr val="accent1"/>
-          </a:solidFill>
-          <a:ln w="9525" cap="flat" cmpd="sng" algn="ctr">
-            <a:solidFill>
-              <a:srgbClr val="0070C0"/>
-            </a:solidFill>
-            <a:prstDash val="solid"/>
-            <a:round/>
-            <a:headEnd type="none" w="med" len="med"/>
-            <a:tailEnd type="triangle"/>
-          </a:ln>
-          <a:effectLst/>
-        </p:spPr>
-      </p:cxnSp>
-      <p:cxnSp>
-        <p:nvCxnSpPr>
-          <p:cNvPr id="70" name="Straight Arrow Connector 69">
-            <a:extLst>
-              <a:ext uri="{FF2B5EF4-FFF2-40B4-BE49-F238E27FC236}">
-                <a16:creationId xmlns:a16="http://schemas.microsoft.com/office/drawing/2014/main" id="{7217BDDC-684E-4A4A-A5F5-CF4D0F6FB17C}"/>
-              </a:ext>
-            </a:extLst>
-          </p:cNvPr>
-          <p:cNvCxnSpPr/>
-          <p:nvPr/>
-        </p:nvCxnSpPr>
-        <p:spPr bwMode="auto">
-          <a:xfrm>
-            <a:off x="3372716" y="3925020"/>
-            <a:ext cx="0" cy="331293"/>
-          </a:xfrm>
-          <a:prstGeom prst="straightConnector1">
-            <a:avLst/>
-          </a:prstGeom>
-          <a:solidFill>
-            <a:schemeClr val="accent1"/>
-          </a:solidFill>
-          <a:ln w="9525" cap="flat" cmpd="sng" algn="ctr">
-            <a:solidFill>
-              <a:srgbClr val="C00000"/>
-            </a:solidFill>
-            <a:prstDash val="lgDash"/>
-            <a:round/>
-            <a:headEnd type="none" w="med" len="med"/>
-            <a:tailEnd type="triangle"/>
-          </a:ln>
-          <a:effectLst/>
-        </p:spPr>
-      </p:cxnSp>
-      <p:cxnSp>
-        <p:nvCxnSpPr>
-          <p:cNvPr id="2064" name="Straight Arrow Connector 2063">
-            <a:extLst>
-              <a:ext uri="{FF2B5EF4-FFF2-40B4-BE49-F238E27FC236}">
-                <a16:creationId xmlns:a16="http://schemas.microsoft.com/office/drawing/2014/main" id="{0768A935-34D1-4AE4-B9FF-49BA5D0D7BA2}"/>
-              </a:ext>
-            </a:extLst>
-          </p:cNvPr>
-          <p:cNvCxnSpPr/>
-          <p:nvPr/>
-        </p:nvCxnSpPr>
-        <p:spPr bwMode="auto">
-          <a:xfrm>
-            <a:off x="4191000" y="3404541"/>
-            <a:ext cx="0" cy="851772"/>
-          </a:xfrm>
-          <a:prstGeom prst="straightConnector1">
-            <a:avLst/>
-          </a:prstGeom>
-          <a:solidFill>
-            <a:schemeClr val="accent1"/>
-          </a:solidFill>
-          <a:ln w="9525" cap="flat" cmpd="sng" algn="ctr">
-            <a:solidFill>
-              <a:srgbClr val="C00000"/>
-            </a:solidFill>
-            <a:prstDash val="lgDash"/>
-            <a:round/>
-            <a:headEnd type="none" w="med" len="med"/>
-            <a:tailEnd type="triangle"/>
-          </a:ln>
-          <a:effectLst/>
-        </p:spPr>
-      </p:cxnSp>
       <p:pic>
         <p:nvPicPr>
           <p:cNvPr id="123" name="Picture 5">
@@ -11982,222 +12395,6 @@
           </a:extLst>
         </p:spPr>
       </p:pic>
-      <p:cxnSp>
-        <p:nvCxnSpPr>
-          <p:cNvPr id="125" name="Straight Arrow Connector 124">
-            <a:extLst>
-              <a:ext uri="{FF2B5EF4-FFF2-40B4-BE49-F238E27FC236}">
-                <a16:creationId xmlns:a16="http://schemas.microsoft.com/office/drawing/2014/main" id="{DB733FF1-B3BD-44C1-AD5A-5A510E439A13}"/>
-              </a:ext>
-            </a:extLst>
-          </p:cNvPr>
-          <p:cNvCxnSpPr/>
-          <p:nvPr/>
-        </p:nvCxnSpPr>
-        <p:spPr bwMode="auto">
-          <a:xfrm>
-            <a:off x="4604490" y="3390767"/>
-            <a:ext cx="0" cy="859680"/>
-          </a:xfrm>
-          <a:prstGeom prst="straightConnector1">
-            <a:avLst/>
-          </a:prstGeom>
-          <a:solidFill>
-            <a:schemeClr val="accent1"/>
-          </a:solidFill>
-          <a:ln w="9525" cap="flat" cmpd="sng" algn="ctr">
-            <a:solidFill>
-              <a:srgbClr val="0070C0"/>
-            </a:solidFill>
-            <a:prstDash val="solid"/>
-            <a:round/>
-            <a:headEnd type="none" w="med" len="med"/>
-            <a:tailEnd type="triangle"/>
-          </a:ln>
-          <a:effectLst/>
-        </p:spPr>
-      </p:cxnSp>
-      <p:cxnSp>
-        <p:nvCxnSpPr>
-          <p:cNvPr id="126" name="Straight Arrow Connector 125">
-            <a:extLst>
-              <a:ext uri="{FF2B5EF4-FFF2-40B4-BE49-F238E27FC236}">
-                <a16:creationId xmlns:a16="http://schemas.microsoft.com/office/drawing/2014/main" id="{92AC891B-DDCD-457A-A38D-EA3FE57F2EBC}"/>
-              </a:ext>
-            </a:extLst>
-          </p:cNvPr>
-          <p:cNvCxnSpPr>
-            <a:cxnSpLocks/>
-          </p:cNvCxnSpPr>
-          <p:nvPr/>
-        </p:nvCxnSpPr>
-        <p:spPr bwMode="auto">
-          <a:xfrm flipV="1">
-            <a:off x="4696723" y="3807321"/>
-            <a:ext cx="585536" cy="443127"/>
-          </a:xfrm>
-          <a:prstGeom prst="straightConnector1">
-            <a:avLst/>
-          </a:prstGeom>
-          <a:solidFill>
-            <a:schemeClr val="accent1"/>
-          </a:solidFill>
-          <a:ln w="9525" cap="flat" cmpd="sng" algn="ctr">
-            <a:solidFill>
-              <a:srgbClr val="0070C0"/>
-            </a:solidFill>
-            <a:prstDash val="solid"/>
-            <a:round/>
-            <a:headEnd type="none" w="med" len="med"/>
-            <a:tailEnd type="triangle"/>
-          </a:ln>
-          <a:effectLst/>
-        </p:spPr>
-      </p:cxnSp>
-      <p:cxnSp>
-        <p:nvCxnSpPr>
-          <p:cNvPr id="128" name="Straight Arrow Connector 127">
-            <a:extLst>
-              <a:ext uri="{FF2B5EF4-FFF2-40B4-BE49-F238E27FC236}">
-                <a16:creationId xmlns:a16="http://schemas.microsoft.com/office/drawing/2014/main" id="{4DAFF06C-0A88-4E7B-A1F2-026E2592144D}"/>
-              </a:ext>
-            </a:extLst>
-          </p:cNvPr>
-          <p:cNvCxnSpPr>
-            <a:cxnSpLocks/>
-          </p:cNvCxnSpPr>
-          <p:nvPr/>
-        </p:nvCxnSpPr>
-        <p:spPr bwMode="auto">
-          <a:xfrm flipV="1">
-            <a:off x="5577806" y="3258390"/>
-            <a:ext cx="529683" cy="388738"/>
-          </a:xfrm>
-          <a:prstGeom prst="straightConnector1">
-            <a:avLst/>
-          </a:prstGeom>
-          <a:solidFill>
-            <a:schemeClr val="accent1"/>
-          </a:solidFill>
-          <a:ln w="9525" cap="flat" cmpd="sng" algn="ctr">
-            <a:solidFill>
-              <a:srgbClr val="0070C0"/>
-            </a:solidFill>
-            <a:prstDash val="solid"/>
-            <a:round/>
-            <a:headEnd type="none" w="med" len="med"/>
-            <a:tailEnd type="triangle"/>
-          </a:ln>
-          <a:effectLst/>
-        </p:spPr>
-      </p:cxnSp>
-      <p:cxnSp>
-        <p:nvCxnSpPr>
-          <p:cNvPr id="129" name="Straight Arrow Connector 128">
-            <a:extLst>
-              <a:ext uri="{FF2B5EF4-FFF2-40B4-BE49-F238E27FC236}">
-                <a16:creationId xmlns:a16="http://schemas.microsoft.com/office/drawing/2014/main" id="{F83DD3D4-7CAD-4EE3-B01F-8A0BC5954AE6}"/>
-              </a:ext>
-            </a:extLst>
-          </p:cNvPr>
-          <p:cNvCxnSpPr/>
-          <p:nvPr/>
-        </p:nvCxnSpPr>
-        <p:spPr bwMode="auto">
-          <a:xfrm>
-            <a:off x="5535899" y="3933620"/>
-            <a:ext cx="0" cy="331293"/>
-          </a:xfrm>
-          <a:prstGeom prst="straightConnector1">
-            <a:avLst/>
-          </a:prstGeom>
-          <a:solidFill>
-            <a:schemeClr val="accent1"/>
-          </a:solidFill>
-          <a:ln w="9525" cap="flat" cmpd="sng" algn="ctr">
-            <a:solidFill>
-              <a:srgbClr val="0070C0"/>
-            </a:solidFill>
-            <a:prstDash val="solid"/>
-            <a:round/>
-            <a:headEnd type="none" w="med" len="med"/>
-            <a:tailEnd type="triangle"/>
-          </a:ln>
-          <a:effectLst/>
-        </p:spPr>
-      </p:cxnSp>
-      <p:cxnSp>
-        <p:nvCxnSpPr>
-          <p:cNvPr id="130" name="Straight Arrow Connector 129">
-            <a:extLst>
-              <a:ext uri="{FF2B5EF4-FFF2-40B4-BE49-F238E27FC236}">
-                <a16:creationId xmlns:a16="http://schemas.microsoft.com/office/drawing/2014/main" id="{C6298FC0-98D9-4DF5-8BE6-E51879BB71C5}"/>
-              </a:ext>
-            </a:extLst>
-          </p:cNvPr>
-          <p:cNvCxnSpPr/>
-          <p:nvPr/>
-        </p:nvCxnSpPr>
-        <p:spPr bwMode="auto">
-          <a:xfrm>
-            <a:off x="6354183" y="3413141"/>
-            <a:ext cx="0" cy="851772"/>
-          </a:xfrm>
-          <a:prstGeom prst="straightConnector1">
-            <a:avLst/>
-          </a:prstGeom>
-          <a:solidFill>
-            <a:schemeClr val="accent1"/>
-          </a:solidFill>
-          <a:ln w="9525" cap="flat" cmpd="sng" algn="ctr">
-            <a:solidFill>
-              <a:srgbClr val="C00000"/>
-            </a:solidFill>
-            <a:prstDash val="lgDash"/>
-            <a:round/>
-            <a:headEnd type="none" w="med" len="med"/>
-            <a:tailEnd type="triangle"/>
-          </a:ln>
-          <a:effectLst/>
-        </p:spPr>
-      </p:cxnSp>
-      <p:cxnSp>
-        <p:nvCxnSpPr>
-          <p:cNvPr id="91" name="Straight Arrow Connector 90">
-            <a:extLst>
-              <a:ext uri="{FF2B5EF4-FFF2-40B4-BE49-F238E27FC236}">
-                <a16:creationId xmlns:a16="http://schemas.microsoft.com/office/drawing/2014/main" id="{FDE8473E-D4E3-43FE-9E15-EBCAA52FC4E6}"/>
-              </a:ext>
-            </a:extLst>
-          </p:cNvPr>
-          <p:cNvCxnSpPr>
-            <a:cxnSpLocks/>
-          </p:cNvCxnSpPr>
-          <p:nvPr/>
-        </p:nvCxnSpPr>
-        <p:spPr bwMode="auto">
-          <a:xfrm>
-            <a:off x="5673350" y="4356262"/>
-            <a:ext cx="434139" cy="0"/>
-          </a:xfrm>
-          <a:prstGeom prst="straightConnector1">
-            <a:avLst/>
-          </a:prstGeom>
-          <a:solidFill>
-            <a:schemeClr val="accent1"/>
-          </a:solidFill>
-          <a:ln w="9525" cap="flat" cmpd="sng" algn="ctr">
-            <a:solidFill>
-              <a:srgbClr val="C00000"/>
-            </a:solidFill>
-            <a:prstDash val="lgDash"/>
-            <a:round/>
-            <a:headEnd type="none" w="med" len="med"/>
-            <a:tailEnd type="triangle"/>
-          </a:ln>
-          <a:effectLst/>
-        </p:spPr>
-      </p:cxnSp>
       <p:pic>
         <p:nvPicPr>
           <p:cNvPr id="145" name="Picture 5">
@@ -12270,10 +12467,10 @@
       </p:pic>
       <p:cxnSp>
         <p:nvCxnSpPr>
-          <p:cNvPr id="147" name="Straight Arrow Connector 146">
+          <p:cNvPr id="9" name="Straight Connector 8">
             <a:extLst>
               <a:ext uri="{FF2B5EF4-FFF2-40B4-BE49-F238E27FC236}">
-                <a16:creationId xmlns:a16="http://schemas.microsoft.com/office/drawing/2014/main" id="{0CED0CEC-94E1-476D-87A2-CC2F56B25513}"/>
+                <a16:creationId xmlns:a16="http://schemas.microsoft.com/office/drawing/2014/main" id="{B30DC6E5-8EAF-4631-B12C-8422675F5B52}"/>
               </a:ext>
             </a:extLst>
           </p:cNvPr>
@@ -12282,33 +12479,138 @@
         </p:nvCxnSpPr>
         <p:spPr bwMode="auto">
           <a:xfrm>
-            <a:off x="329624" y="4989527"/>
-            <a:ext cx="0" cy="859680"/>
+            <a:off x="2533540" y="1647012"/>
+            <a:ext cx="0" cy="990600"/>
           </a:xfrm>
-          <a:prstGeom prst="straightConnector1">
+          <a:prstGeom prst="line">
             <a:avLst/>
           </a:prstGeom>
           <a:solidFill>
             <a:schemeClr val="accent1"/>
           </a:solidFill>
-          <a:ln w="9525" cap="flat" cmpd="sng" algn="ctr">
+          <a:ln w="28575" cap="flat" cmpd="sng" algn="ctr">
+            <a:solidFill>
+              <a:srgbClr val="C00000"/>
+            </a:solidFill>
+            <a:prstDash val="dash"/>
+            <a:round/>
+            <a:headEnd type="none" w="med" len="med"/>
+            <a:tailEnd type="none" w="med" len="med"/>
+          </a:ln>
+          <a:effectLst/>
+        </p:spPr>
+      </p:cxnSp>
+      <p:cxnSp>
+        <p:nvCxnSpPr>
+          <p:cNvPr id="11" name="Straight Connector 10">
+            <a:extLst>
+              <a:ext uri="{FF2B5EF4-FFF2-40B4-BE49-F238E27FC236}">
+                <a16:creationId xmlns:a16="http://schemas.microsoft.com/office/drawing/2014/main" id="{A113AD51-2DB5-4227-8984-54CB931B6D04}"/>
+              </a:ext>
+            </a:extLst>
+          </p:cNvPr>
+          <p:cNvCxnSpPr/>
+          <p:nvPr/>
+        </p:nvCxnSpPr>
+        <p:spPr bwMode="auto">
+          <a:xfrm>
+            <a:off x="2802390" y="1447800"/>
+            <a:ext cx="1388610" cy="0"/>
+          </a:xfrm>
+          <a:prstGeom prst="line">
+            <a:avLst/>
+          </a:prstGeom>
+          <a:solidFill>
+            <a:schemeClr val="accent1"/>
+          </a:solidFill>
+          <a:ln w="28575" cap="flat" cmpd="sng" algn="ctr">
+            <a:solidFill>
+              <a:srgbClr val="C00000"/>
+            </a:solidFill>
+            <a:prstDash val="dash"/>
+            <a:round/>
+            <a:headEnd type="none" w="med" len="med"/>
+            <a:tailEnd type="none" w="med" len="med"/>
+          </a:ln>
+          <a:effectLst/>
+        </p:spPr>
+      </p:cxnSp>
+      <p:cxnSp>
+        <p:nvCxnSpPr>
+          <p:cNvPr id="14" name="Straight Connector 13">
+            <a:extLst>
+              <a:ext uri="{FF2B5EF4-FFF2-40B4-BE49-F238E27FC236}">
+                <a16:creationId xmlns:a16="http://schemas.microsoft.com/office/drawing/2014/main" id="{C15803C6-EC27-4DFE-87B3-2D3CEE2EEBFB}"/>
+              </a:ext>
+            </a:extLst>
+          </p:cNvPr>
+          <p:cNvCxnSpPr/>
+          <p:nvPr/>
+        </p:nvCxnSpPr>
+        <p:spPr bwMode="auto">
+          <a:xfrm>
+            <a:off x="4979297" y="1447800"/>
+            <a:ext cx="1322428" cy="0"/>
+          </a:xfrm>
+          <a:prstGeom prst="line">
+            <a:avLst/>
+          </a:prstGeom>
+          <a:solidFill>
+            <a:schemeClr val="accent1"/>
+          </a:solidFill>
+          <a:ln w="28575" cap="flat" cmpd="sng" algn="ctr">
+            <a:solidFill>
+              <a:srgbClr val="C00000"/>
+            </a:solidFill>
+            <a:prstDash val="dash"/>
+            <a:round/>
+            <a:headEnd type="none" w="med" len="med"/>
+            <a:tailEnd type="none" w="med" len="med"/>
+          </a:ln>
+          <a:effectLst/>
+        </p:spPr>
+      </p:cxnSp>
+      <p:cxnSp>
+        <p:nvCxnSpPr>
+          <p:cNvPr id="16" name="Straight Connector 15">
+            <a:extLst>
+              <a:ext uri="{FF2B5EF4-FFF2-40B4-BE49-F238E27FC236}">
+                <a16:creationId xmlns:a16="http://schemas.microsoft.com/office/drawing/2014/main" id="{1E82E68D-4B91-47ED-929F-2FF616AA1A76}"/>
+              </a:ext>
+            </a:extLst>
+          </p:cNvPr>
+          <p:cNvCxnSpPr/>
+          <p:nvPr/>
+        </p:nvCxnSpPr>
+        <p:spPr bwMode="auto">
+          <a:xfrm>
+            <a:off x="4696723" y="1705787"/>
+            <a:ext cx="0" cy="931825"/>
+          </a:xfrm>
+          <a:prstGeom prst="line">
+            <a:avLst/>
+          </a:prstGeom>
+          <a:solidFill>
+            <a:schemeClr val="accent1"/>
+          </a:solidFill>
+          <a:ln w="28575" cap="flat" cmpd="sng" algn="ctr">
             <a:solidFill>
               <a:srgbClr val="0070C0"/>
             </a:solidFill>
             <a:prstDash val="solid"/>
             <a:round/>
             <a:headEnd type="none" w="med" len="med"/>
-            <a:tailEnd type="triangle"/>
+            <a:tailEnd type="none" w="med" len="med"/>
           </a:ln>
           <a:effectLst/>
         </p:spPr>
       </p:cxnSp>
       <p:cxnSp>
         <p:nvCxnSpPr>
-          <p:cNvPr id="148" name="Straight Arrow Connector 147">
+          <p:cNvPr id="21" name="Straight Connector 20">
             <a:extLst>
               <a:ext uri="{FF2B5EF4-FFF2-40B4-BE49-F238E27FC236}">
-                <a16:creationId xmlns:a16="http://schemas.microsoft.com/office/drawing/2014/main" id="{04FBCECA-5737-44F7-98B2-ABD2EC7FD215}"/>
+                <a16:creationId xmlns:a16="http://schemas.microsoft.com/office/drawing/2014/main" id="{E57FF158-F6DF-448D-BF7E-C7C34E699625}"/>
               </a:ext>
             </a:extLst>
           </p:cNvPr>
@@ -12319,10 +12621,45 @@
         </p:nvCxnSpPr>
         <p:spPr bwMode="auto">
           <a:xfrm flipV="1">
-            <a:off x="421857" y="5406081"/>
-            <a:ext cx="585536" cy="443127"/>
+            <a:off x="4800600" y="2133600"/>
+            <a:ext cx="675243" cy="457200"/>
           </a:xfrm>
-          <a:prstGeom prst="straightConnector1">
+          <a:prstGeom prst="line">
+            <a:avLst/>
+          </a:prstGeom>
+          <a:solidFill>
+            <a:schemeClr val="accent1"/>
+          </a:solidFill>
+          <a:ln w="28575" cap="flat" cmpd="sng" algn="ctr">
+            <a:solidFill>
+              <a:srgbClr val="C00000"/>
+            </a:solidFill>
+            <a:prstDash val="dash"/>
+            <a:round/>
+            <a:headEnd type="none" w="med" len="med"/>
+            <a:tailEnd type="none" w="med" len="med"/>
+          </a:ln>
+          <a:effectLst/>
+        </p:spPr>
+      </p:cxnSp>
+      <p:cxnSp>
+        <p:nvCxnSpPr>
+          <p:cNvPr id="24" name="Straight Connector 23">
+            <a:extLst>
+              <a:ext uri="{FF2B5EF4-FFF2-40B4-BE49-F238E27FC236}">
+                <a16:creationId xmlns:a16="http://schemas.microsoft.com/office/drawing/2014/main" id="{78D83919-9891-4BF3-9879-967B3D69D6BB}"/>
+              </a:ext>
+            </a:extLst>
+          </p:cNvPr>
+          <p:cNvCxnSpPr/>
+          <p:nvPr/>
+        </p:nvCxnSpPr>
+        <p:spPr bwMode="auto">
+          <a:xfrm>
+            <a:off x="4914900" y="2743200"/>
+            <a:ext cx="620999" cy="0"/>
+          </a:xfrm>
+          <a:prstGeom prst="line">
             <a:avLst/>
           </a:prstGeom>
           <a:solidFill>
@@ -12330,22 +12667,92 @@
           </a:solidFill>
           <a:ln w="9525" cap="flat" cmpd="sng" algn="ctr">
             <a:solidFill>
-              <a:srgbClr val="0070C0"/>
+              <a:schemeClr val="tx1"/>
             </a:solidFill>
             <a:prstDash val="solid"/>
             <a:round/>
             <a:headEnd type="none" w="med" len="med"/>
-            <a:tailEnd type="triangle"/>
+            <a:tailEnd type="none" w="med" len="med"/>
           </a:ln>
           <a:effectLst/>
         </p:spPr>
       </p:cxnSp>
       <p:cxnSp>
         <p:nvCxnSpPr>
-          <p:cNvPr id="150" name="Straight Arrow Connector 149">
+          <p:cNvPr id="2048" name="Straight Connector 2047">
             <a:extLst>
               <a:ext uri="{FF2B5EF4-FFF2-40B4-BE49-F238E27FC236}">
-                <a16:creationId xmlns:a16="http://schemas.microsoft.com/office/drawing/2014/main" id="{CFB1D6F6-85B7-4443-89C0-239CA2267022}"/>
+                <a16:creationId xmlns:a16="http://schemas.microsoft.com/office/drawing/2014/main" id="{F5CDB197-DAD4-485B-8CF3-5813B10412AD}"/>
+              </a:ext>
+            </a:extLst>
+          </p:cNvPr>
+          <p:cNvCxnSpPr/>
+          <p:nvPr/>
+        </p:nvCxnSpPr>
+        <p:spPr bwMode="auto">
+          <a:xfrm>
+            <a:off x="4902563" y="2819400"/>
+            <a:ext cx="675243" cy="0"/>
+          </a:xfrm>
+          <a:prstGeom prst="line">
+            <a:avLst/>
+          </a:prstGeom>
+          <a:solidFill>
+            <a:schemeClr val="accent1"/>
+          </a:solidFill>
+          <a:ln w="28575" cap="flat" cmpd="sng" algn="ctr">
+            <a:solidFill>
+              <a:srgbClr val="C00000"/>
+            </a:solidFill>
+            <a:prstDash val="dash"/>
+            <a:round/>
+            <a:headEnd type="none" w="med" len="med"/>
+            <a:tailEnd type="none" w="med" len="med"/>
+          </a:ln>
+          <a:effectLst/>
+        </p:spPr>
+      </p:cxnSp>
+      <p:cxnSp>
+        <p:nvCxnSpPr>
+          <p:cNvPr id="2056" name="Straight Connector 2055">
+            <a:extLst>
+              <a:ext uri="{FF2B5EF4-FFF2-40B4-BE49-F238E27FC236}">
+                <a16:creationId xmlns:a16="http://schemas.microsoft.com/office/drawing/2014/main" id="{AAFACDBD-E15D-4F8C-A6B8-1D33422C1E72}"/>
+              </a:ext>
+            </a:extLst>
+          </p:cNvPr>
+          <p:cNvCxnSpPr/>
+          <p:nvPr/>
+        </p:nvCxnSpPr>
+        <p:spPr bwMode="auto">
+          <a:xfrm>
+            <a:off x="329624" y="3334173"/>
+            <a:ext cx="0" cy="988313"/>
+          </a:xfrm>
+          <a:prstGeom prst="line">
+            <a:avLst/>
+          </a:prstGeom>
+          <a:solidFill>
+            <a:schemeClr val="accent1"/>
+          </a:solidFill>
+          <a:ln w="28575" cap="flat" cmpd="sng" algn="ctr">
+            <a:solidFill>
+              <a:srgbClr val="0070C0"/>
+            </a:solidFill>
+            <a:prstDash val="solid"/>
+            <a:round/>
+            <a:headEnd type="none" w="med" len="med"/>
+            <a:tailEnd type="none" w="med" len="med"/>
+          </a:ln>
+          <a:effectLst/>
+        </p:spPr>
+      </p:cxnSp>
+      <p:cxnSp>
+        <p:nvCxnSpPr>
+          <p:cNvPr id="2059" name="Straight Connector 2058">
+            <a:extLst>
+              <a:ext uri="{FF2B5EF4-FFF2-40B4-BE49-F238E27FC236}">
+                <a16:creationId xmlns:a16="http://schemas.microsoft.com/office/drawing/2014/main" id="{1580D86D-0ADF-46D5-B3A4-0D49128D9162}"/>
               </a:ext>
             </a:extLst>
           </p:cNvPr>
@@ -12356,33 +12763,255 @@
         </p:nvCxnSpPr>
         <p:spPr bwMode="auto">
           <a:xfrm flipV="1">
-            <a:off x="1302940" y="4857150"/>
-            <a:ext cx="529683" cy="388738"/>
+            <a:off x="444421" y="3772711"/>
+            <a:ext cx="670069" cy="477736"/>
           </a:xfrm>
-          <a:prstGeom prst="straightConnector1">
+          <a:prstGeom prst="line">
             <a:avLst/>
           </a:prstGeom>
           <a:solidFill>
             <a:schemeClr val="accent1"/>
           </a:solidFill>
-          <a:ln w="9525" cap="flat" cmpd="sng" algn="ctr">
+          <a:ln w="28575" cap="flat" cmpd="sng" algn="ctr">
             <a:solidFill>
               <a:srgbClr val="0070C0"/>
             </a:solidFill>
             <a:prstDash val="solid"/>
             <a:round/>
             <a:headEnd type="none" w="med" len="med"/>
-            <a:tailEnd type="triangle"/>
+            <a:tailEnd type="none" w="med" len="med"/>
           </a:ln>
           <a:effectLst/>
         </p:spPr>
       </p:cxnSp>
       <p:cxnSp>
         <p:nvCxnSpPr>
-          <p:cNvPr id="151" name="Straight Arrow Connector 150">
+          <p:cNvPr id="2068" name="Straight Connector 2067">
             <a:extLst>
               <a:ext uri="{FF2B5EF4-FFF2-40B4-BE49-F238E27FC236}">
-                <a16:creationId xmlns:a16="http://schemas.microsoft.com/office/drawing/2014/main" id="{D53E5965-A1BA-4566-A421-CD34AE425A74}"/>
+                <a16:creationId xmlns:a16="http://schemas.microsoft.com/office/drawing/2014/main" id="{3B477918-BD3C-4502-AD5E-B8ED00D6F616}"/>
+              </a:ext>
+            </a:extLst>
+          </p:cNvPr>
+          <p:cNvCxnSpPr>
+            <a:cxnSpLocks/>
+          </p:cNvCxnSpPr>
+          <p:nvPr/>
+        </p:nvCxnSpPr>
+        <p:spPr bwMode="auto">
+          <a:xfrm>
+            <a:off x="299912" y="4942950"/>
+            <a:ext cx="0" cy="948765"/>
+          </a:xfrm>
+          <a:prstGeom prst="line">
+            <a:avLst/>
+          </a:prstGeom>
+          <a:solidFill>
+            <a:schemeClr val="accent1"/>
+          </a:solidFill>
+          <a:ln w="28575" cap="flat" cmpd="sng" algn="ctr">
+            <a:solidFill>
+              <a:srgbClr val="0070C0"/>
+            </a:solidFill>
+            <a:prstDash val="solid"/>
+            <a:round/>
+            <a:headEnd type="none" w="med" len="med"/>
+            <a:tailEnd type="none" w="med" len="med"/>
+          </a:ln>
+          <a:effectLst/>
+        </p:spPr>
+      </p:cxnSp>
+      <p:cxnSp>
+        <p:nvCxnSpPr>
+          <p:cNvPr id="2070" name="Straight Connector 2069">
+            <a:extLst>
+              <a:ext uri="{FF2B5EF4-FFF2-40B4-BE49-F238E27FC236}">
+                <a16:creationId xmlns:a16="http://schemas.microsoft.com/office/drawing/2014/main" id="{8C652680-5299-4AEA-A6B0-80489F5489B8}"/>
+              </a:ext>
+            </a:extLst>
+          </p:cNvPr>
+          <p:cNvCxnSpPr>
+            <a:cxnSpLocks/>
+          </p:cNvCxnSpPr>
+          <p:nvPr/>
+        </p:nvCxnSpPr>
+        <p:spPr bwMode="auto">
+          <a:xfrm flipV="1">
+            <a:off x="429314" y="5415539"/>
+            <a:ext cx="653005" cy="476176"/>
+          </a:xfrm>
+          <a:prstGeom prst="line">
+            <a:avLst/>
+          </a:prstGeom>
+          <a:solidFill>
+            <a:schemeClr val="accent1"/>
+          </a:solidFill>
+          <a:ln w="28575" cap="flat" cmpd="sng" algn="ctr">
+            <a:solidFill>
+              <a:srgbClr val="0070C0"/>
+            </a:solidFill>
+            <a:prstDash val="solid"/>
+            <a:round/>
+            <a:headEnd type="none" w="med" len="med"/>
+            <a:tailEnd type="none" w="med" len="med"/>
+          </a:ln>
+          <a:effectLst/>
+        </p:spPr>
+      </p:cxnSp>
+      <p:cxnSp>
+        <p:nvCxnSpPr>
+          <p:cNvPr id="2072" name="Straight Connector 2071">
+            <a:extLst>
+              <a:ext uri="{FF2B5EF4-FFF2-40B4-BE49-F238E27FC236}">
+                <a16:creationId xmlns:a16="http://schemas.microsoft.com/office/drawing/2014/main" id="{21D251A3-757C-460B-B070-41C3D5DFA567}"/>
+              </a:ext>
+            </a:extLst>
+          </p:cNvPr>
+          <p:cNvCxnSpPr>
+            <a:cxnSpLocks/>
+          </p:cNvCxnSpPr>
+          <p:nvPr/>
+        </p:nvCxnSpPr>
+        <p:spPr bwMode="auto">
+          <a:xfrm flipV="1">
+            <a:off x="1275704" y="4865895"/>
+            <a:ext cx="581065" cy="423273"/>
+          </a:xfrm>
+          <a:prstGeom prst="line">
+            <a:avLst/>
+          </a:prstGeom>
+          <a:solidFill>
+            <a:schemeClr val="accent1"/>
+          </a:solidFill>
+          <a:ln w="28575" cap="flat" cmpd="sng" algn="ctr">
+            <a:solidFill>
+              <a:srgbClr val="0070C0"/>
+            </a:solidFill>
+            <a:prstDash val="solid"/>
+            <a:round/>
+            <a:headEnd type="none" w="med" len="med"/>
+            <a:tailEnd type="none" w="med" len="med"/>
+          </a:ln>
+          <a:effectLst/>
+        </p:spPr>
+      </p:cxnSp>
+      <p:cxnSp>
+        <p:nvCxnSpPr>
+          <p:cNvPr id="2074" name="Straight Connector 2073">
+            <a:extLst>
+              <a:ext uri="{FF2B5EF4-FFF2-40B4-BE49-F238E27FC236}">
+                <a16:creationId xmlns:a16="http://schemas.microsoft.com/office/drawing/2014/main" id="{D337D44F-E10A-44A5-B9C0-ED44910D11D7}"/>
+              </a:ext>
+            </a:extLst>
+          </p:cNvPr>
+          <p:cNvCxnSpPr>
+            <a:cxnSpLocks/>
+          </p:cNvCxnSpPr>
+          <p:nvPr/>
+        </p:nvCxnSpPr>
+        <p:spPr bwMode="auto">
+          <a:xfrm>
+            <a:off x="2057400" y="4942950"/>
+            <a:ext cx="0" cy="948765"/>
+          </a:xfrm>
+          <a:prstGeom prst="line">
+            <a:avLst/>
+          </a:prstGeom>
+          <a:solidFill>
+            <a:schemeClr val="accent1"/>
+          </a:solidFill>
+          <a:ln w="28575" cap="flat" cmpd="sng" algn="ctr">
+            <a:solidFill>
+              <a:srgbClr val="0070C0"/>
+            </a:solidFill>
+            <a:prstDash val="solid"/>
+            <a:round/>
+            <a:headEnd type="none" w="med" len="med"/>
+            <a:tailEnd type="none" w="med" len="med"/>
+          </a:ln>
+          <a:effectLst/>
+        </p:spPr>
+      </p:cxnSp>
+      <p:cxnSp>
+        <p:nvCxnSpPr>
+          <p:cNvPr id="2076" name="Straight Connector 2075">
+            <a:extLst>
+              <a:ext uri="{FF2B5EF4-FFF2-40B4-BE49-F238E27FC236}">
+                <a16:creationId xmlns:a16="http://schemas.microsoft.com/office/drawing/2014/main" id="{992C054D-B757-46D2-9A4A-F93B89586905}"/>
+              </a:ext>
+            </a:extLst>
+          </p:cNvPr>
+          <p:cNvCxnSpPr>
+            <a:cxnSpLocks/>
+          </p:cNvCxnSpPr>
+          <p:nvPr/>
+        </p:nvCxnSpPr>
+        <p:spPr bwMode="auto">
+          <a:xfrm>
+            <a:off x="1275704" y="5486400"/>
+            <a:ext cx="0" cy="451260"/>
+          </a:xfrm>
+          <a:prstGeom prst="line">
+            <a:avLst/>
+          </a:prstGeom>
+          <a:solidFill>
+            <a:schemeClr val="accent1"/>
+          </a:solidFill>
+          <a:ln w="28575" cap="flat" cmpd="sng" algn="ctr">
+            <a:solidFill>
+              <a:srgbClr val="0070C0"/>
+            </a:solidFill>
+            <a:prstDash val="solid"/>
+            <a:round/>
+            <a:headEnd type="none" w="med" len="med"/>
+            <a:tailEnd type="none" w="med" len="med"/>
+          </a:ln>
+          <a:effectLst/>
+        </p:spPr>
+      </p:cxnSp>
+      <p:cxnSp>
+        <p:nvCxnSpPr>
+          <p:cNvPr id="89" name="Straight Connector 88">
+            <a:extLst>
+              <a:ext uri="{FF2B5EF4-FFF2-40B4-BE49-F238E27FC236}">
+                <a16:creationId xmlns:a16="http://schemas.microsoft.com/office/drawing/2014/main" id="{4E9763B6-BFA3-4672-B26F-F05809A42A90}"/>
+              </a:ext>
+            </a:extLst>
+          </p:cNvPr>
+          <p:cNvCxnSpPr>
+            <a:cxnSpLocks/>
+          </p:cNvCxnSpPr>
+          <p:nvPr/>
+        </p:nvCxnSpPr>
+        <p:spPr bwMode="auto">
+          <a:xfrm>
+            <a:off x="2441307" y="3316148"/>
+            <a:ext cx="0" cy="948765"/>
+          </a:xfrm>
+          <a:prstGeom prst="line">
+            <a:avLst/>
+          </a:prstGeom>
+          <a:solidFill>
+            <a:schemeClr val="accent1"/>
+          </a:solidFill>
+          <a:ln w="28575" cap="flat" cmpd="sng" algn="ctr">
+            <a:solidFill>
+              <a:srgbClr val="0070C0"/>
+            </a:solidFill>
+            <a:prstDash val="solid"/>
+            <a:round/>
+            <a:headEnd type="none" w="med" len="med"/>
+            <a:tailEnd type="none" w="med" len="med"/>
+          </a:ln>
+          <a:effectLst/>
+        </p:spPr>
+      </p:cxnSp>
+      <p:cxnSp>
+        <p:nvCxnSpPr>
+          <p:cNvPr id="90" name="Straight Connector 89">
+            <a:extLst>
+              <a:ext uri="{FF2B5EF4-FFF2-40B4-BE49-F238E27FC236}">
+                <a16:creationId xmlns:a16="http://schemas.microsoft.com/office/drawing/2014/main" id="{3CF4F470-8681-4640-A9A4-E1557F9150AF}"/>
               </a:ext>
             </a:extLst>
           </p:cNvPr>
@@ -12391,33 +13020,107 @@
         </p:nvCxnSpPr>
         <p:spPr bwMode="auto">
           <a:xfrm>
-            <a:off x="1261033" y="5532380"/>
-            <a:ext cx="0" cy="331293"/>
+            <a:off x="552773" y="3124200"/>
+            <a:ext cx="1388610" cy="0"/>
           </a:xfrm>
-          <a:prstGeom prst="straightConnector1">
+          <a:prstGeom prst="line">
             <a:avLst/>
           </a:prstGeom>
           <a:solidFill>
             <a:schemeClr val="accent1"/>
           </a:solidFill>
-          <a:ln w="9525" cap="flat" cmpd="sng" algn="ctr">
+          <a:ln w="28575" cap="flat" cmpd="sng" algn="ctr">
+            <a:solidFill>
+              <a:srgbClr val="C00000"/>
+            </a:solidFill>
+            <a:prstDash val="dash"/>
+            <a:round/>
+            <a:headEnd type="none" w="med" len="med"/>
+            <a:tailEnd type="none" w="med" len="med"/>
+          </a:ln>
+          <a:effectLst/>
+        </p:spPr>
+      </p:cxnSp>
+      <p:cxnSp>
+        <p:nvCxnSpPr>
+          <p:cNvPr id="92" name="Straight Connector 91">
+            <a:extLst>
+              <a:ext uri="{FF2B5EF4-FFF2-40B4-BE49-F238E27FC236}">
+                <a16:creationId xmlns:a16="http://schemas.microsoft.com/office/drawing/2014/main" id="{CA624605-E01C-4F69-98B0-92D60C9090B8}"/>
+              </a:ext>
+            </a:extLst>
+          </p:cNvPr>
+          <p:cNvCxnSpPr>
+            <a:cxnSpLocks/>
+          </p:cNvCxnSpPr>
+          <p:nvPr/>
+        </p:nvCxnSpPr>
+        <p:spPr bwMode="auto">
+          <a:xfrm flipV="1">
+            <a:off x="2533540" y="3790530"/>
+            <a:ext cx="653005" cy="476176"/>
+          </a:xfrm>
+          <a:prstGeom prst="line">
+            <a:avLst/>
+          </a:prstGeom>
+          <a:solidFill>
+            <a:schemeClr val="accent1"/>
+          </a:solidFill>
+          <a:ln w="28575" cap="flat" cmpd="sng" algn="ctr">
             <a:solidFill>
               <a:srgbClr val="0070C0"/>
             </a:solidFill>
             <a:prstDash val="solid"/>
             <a:round/>
             <a:headEnd type="none" w="med" len="med"/>
-            <a:tailEnd type="triangle"/>
+            <a:tailEnd type="none" w="med" len="med"/>
           </a:ln>
           <a:effectLst/>
         </p:spPr>
       </p:cxnSp>
       <p:cxnSp>
         <p:nvCxnSpPr>
-          <p:cNvPr id="152" name="Straight Arrow Connector 151">
+          <p:cNvPr id="93" name="Straight Connector 92">
             <a:extLst>
               <a:ext uri="{FF2B5EF4-FFF2-40B4-BE49-F238E27FC236}">
-                <a16:creationId xmlns:a16="http://schemas.microsoft.com/office/drawing/2014/main" id="{4EED0CDB-C6B5-4317-941D-D4D060B2FC3D}"/>
+                <a16:creationId xmlns:a16="http://schemas.microsoft.com/office/drawing/2014/main" id="{6626C03E-EF75-4E84-A469-6EC1426B6BD6}"/>
+              </a:ext>
+            </a:extLst>
+          </p:cNvPr>
+          <p:cNvCxnSpPr>
+            <a:cxnSpLocks/>
+          </p:cNvCxnSpPr>
+          <p:nvPr/>
+        </p:nvCxnSpPr>
+        <p:spPr bwMode="auto">
+          <a:xfrm flipV="1">
+            <a:off x="3413810" y="3223855"/>
+            <a:ext cx="581065" cy="423273"/>
+          </a:xfrm>
+          <a:prstGeom prst="line">
+            <a:avLst/>
+          </a:prstGeom>
+          <a:solidFill>
+            <a:schemeClr val="accent1"/>
+          </a:solidFill>
+          <a:ln w="28575" cap="flat" cmpd="sng" algn="ctr">
+            <a:solidFill>
+              <a:srgbClr val="0070C0"/>
+            </a:solidFill>
+            <a:prstDash val="solid"/>
+            <a:round/>
+            <a:headEnd type="none" w="med" len="med"/>
+            <a:tailEnd type="none" w="med" len="med"/>
+          </a:ln>
+          <a:effectLst/>
+        </p:spPr>
+      </p:cxnSp>
+      <p:cxnSp>
+        <p:nvCxnSpPr>
+          <p:cNvPr id="94" name="Straight Connector 93">
+            <a:extLst>
+              <a:ext uri="{FF2B5EF4-FFF2-40B4-BE49-F238E27FC236}">
+                <a16:creationId xmlns:a16="http://schemas.microsoft.com/office/drawing/2014/main" id="{38269E5A-1318-4202-969A-03BD9E278CA0}"/>
               </a:ext>
             </a:extLst>
           </p:cNvPr>
@@ -12426,27 +13129,576 @@
         </p:nvCxnSpPr>
         <p:spPr bwMode="auto">
           <a:xfrm>
-            <a:off x="2079317" y="5011901"/>
-            <a:ext cx="0" cy="851772"/>
+            <a:off x="2620638" y="4356262"/>
+            <a:ext cx="675243" cy="0"/>
           </a:xfrm>
-          <a:prstGeom prst="straightConnector1">
+          <a:prstGeom prst="line">
             <a:avLst/>
           </a:prstGeom>
           <a:solidFill>
             <a:schemeClr val="accent1"/>
           </a:solidFill>
-          <a:ln w="9525" cap="flat" cmpd="sng" algn="ctr">
+          <a:ln w="28575" cap="flat" cmpd="sng" algn="ctr">
+            <a:solidFill>
+              <a:srgbClr val="C00000"/>
+            </a:solidFill>
+            <a:prstDash val="dash"/>
+            <a:round/>
+            <a:headEnd type="none" w="med" len="med"/>
+            <a:tailEnd type="none" w="med" len="med"/>
+          </a:ln>
+          <a:effectLst/>
+        </p:spPr>
+      </p:cxnSp>
+      <p:cxnSp>
+        <p:nvCxnSpPr>
+          <p:cNvPr id="95" name="Straight Connector 94">
+            <a:extLst>
+              <a:ext uri="{FF2B5EF4-FFF2-40B4-BE49-F238E27FC236}">
+                <a16:creationId xmlns:a16="http://schemas.microsoft.com/office/drawing/2014/main" id="{1C6DEF21-8991-4568-AB2A-E63F420A92C4}"/>
+              </a:ext>
+            </a:extLst>
+          </p:cNvPr>
+          <p:cNvCxnSpPr>
+            <a:cxnSpLocks/>
+          </p:cNvCxnSpPr>
+          <p:nvPr/>
+        </p:nvCxnSpPr>
+        <p:spPr bwMode="auto">
+          <a:xfrm>
+            <a:off x="4584080" y="3353946"/>
+            <a:ext cx="0" cy="948765"/>
+          </a:xfrm>
+          <a:prstGeom prst="line">
+            <a:avLst/>
+          </a:prstGeom>
+          <a:solidFill>
+            <a:schemeClr val="accent1"/>
+          </a:solidFill>
+          <a:ln w="28575" cap="flat" cmpd="sng" algn="ctr">
             <a:solidFill>
               <a:srgbClr val="0070C0"/>
             </a:solidFill>
             <a:prstDash val="solid"/>
             <a:round/>
             <a:headEnd type="none" w="med" len="med"/>
-            <a:tailEnd type="triangle"/>
+            <a:tailEnd type="none" w="med" len="med"/>
           </a:ln>
           <a:effectLst/>
         </p:spPr>
       </p:cxnSp>
+      <p:cxnSp>
+        <p:nvCxnSpPr>
+          <p:cNvPr id="96" name="Straight Connector 95">
+            <a:extLst>
+              <a:ext uri="{FF2B5EF4-FFF2-40B4-BE49-F238E27FC236}">
+                <a16:creationId xmlns:a16="http://schemas.microsoft.com/office/drawing/2014/main" id="{FE35C0CE-C655-4D98-AF22-696CC4A8B0A4}"/>
+              </a:ext>
+            </a:extLst>
+          </p:cNvPr>
+          <p:cNvCxnSpPr>
+            <a:cxnSpLocks/>
+          </p:cNvCxnSpPr>
+          <p:nvPr/>
+        </p:nvCxnSpPr>
+        <p:spPr bwMode="auto">
+          <a:xfrm flipV="1">
+            <a:off x="4720329" y="3783821"/>
+            <a:ext cx="653005" cy="476176"/>
+          </a:xfrm>
+          <a:prstGeom prst="line">
+            <a:avLst/>
+          </a:prstGeom>
+          <a:solidFill>
+            <a:schemeClr val="accent1"/>
+          </a:solidFill>
+          <a:ln w="28575" cap="flat" cmpd="sng" algn="ctr">
+            <a:solidFill>
+              <a:srgbClr val="0070C0"/>
+            </a:solidFill>
+            <a:prstDash val="solid"/>
+            <a:round/>
+            <a:headEnd type="none" w="med" len="med"/>
+            <a:tailEnd type="none" w="med" len="med"/>
+          </a:ln>
+          <a:effectLst/>
+        </p:spPr>
+      </p:cxnSp>
+      <p:cxnSp>
+        <p:nvCxnSpPr>
+          <p:cNvPr id="97" name="Straight Connector 96">
+            <a:extLst>
+              <a:ext uri="{FF2B5EF4-FFF2-40B4-BE49-F238E27FC236}">
+                <a16:creationId xmlns:a16="http://schemas.microsoft.com/office/drawing/2014/main" id="{EC9442EE-AF1A-447F-ACCD-6F193E723810}"/>
+              </a:ext>
+            </a:extLst>
+          </p:cNvPr>
+          <p:cNvCxnSpPr>
+            <a:cxnSpLocks/>
+          </p:cNvCxnSpPr>
+          <p:nvPr/>
+        </p:nvCxnSpPr>
+        <p:spPr bwMode="auto">
+          <a:xfrm flipV="1">
+            <a:off x="5577806" y="3236386"/>
+            <a:ext cx="553289" cy="410742"/>
+          </a:xfrm>
+          <a:prstGeom prst="line">
+            <a:avLst/>
+          </a:prstGeom>
+          <a:solidFill>
+            <a:schemeClr val="accent1"/>
+          </a:solidFill>
+          <a:ln w="28575" cap="flat" cmpd="sng" algn="ctr">
+            <a:solidFill>
+              <a:srgbClr val="0070C0"/>
+            </a:solidFill>
+            <a:prstDash val="solid"/>
+            <a:round/>
+            <a:headEnd type="none" w="med" len="med"/>
+            <a:tailEnd type="none" w="med" len="med"/>
+          </a:ln>
+          <a:effectLst/>
+        </p:spPr>
+      </p:cxnSp>
+      <p:cxnSp>
+        <p:nvCxnSpPr>
+          <p:cNvPr id="98" name="Straight Connector 97">
+            <a:extLst>
+              <a:ext uri="{FF2B5EF4-FFF2-40B4-BE49-F238E27FC236}">
+                <a16:creationId xmlns:a16="http://schemas.microsoft.com/office/drawing/2014/main" id="{97B9A299-6162-4501-92DA-112564D197D7}"/>
+              </a:ext>
+            </a:extLst>
+          </p:cNvPr>
+          <p:cNvCxnSpPr>
+            <a:cxnSpLocks/>
+          </p:cNvCxnSpPr>
+          <p:nvPr/>
+        </p:nvCxnSpPr>
+        <p:spPr bwMode="auto">
+          <a:xfrm>
+            <a:off x="5586336" y="3902036"/>
+            <a:ext cx="0" cy="451260"/>
+          </a:xfrm>
+          <a:prstGeom prst="line">
+            <a:avLst/>
+          </a:prstGeom>
+          <a:solidFill>
+            <a:schemeClr val="accent1"/>
+          </a:solidFill>
+          <a:ln w="28575" cap="flat" cmpd="sng" algn="ctr">
+            <a:solidFill>
+              <a:srgbClr val="0070C0"/>
+            </a:solidFill>
+            <a:prstDash val="solid"/>
+            <a:round/>
+            <a:headEnd type="none" w="med" len="med"/>
+            <a:tailEnd type="none" w="med" len="med"/>
+          </a:ln>
+          <a:effectLst/>
+        </p:spPr>
+      </p:cxnSp>
+      <p:cxnSp>
+        <p:nvCxnSpPr>
+          <p:cNvPr id="99" name="Straight Connector 98">
+            <a:extLst>
+              <a:ext uri="{FF2B5EF4-FFF2-40B4-BE49-F238E27FC236}">
+                <a16:creationId xmlns:a16="http://schemas.microsoft.com/office/drawing/2014/main" id="{0E5BFC47-13E7-4F51-8526-E8D024446C67}"/>
+              </a:ext>
+            </a:extLst>
+          </p:cNvPr>
+          <p:cNvCxnSpPr/>
+          <p:nvPr/>
+        </p:nvCxnSpPr>
+        <p:spPr bwMode="auto">
+          <a:xfrm>
+            <a:off x="495731" y="4388318"/>
+            <a:ext cx="675243" cy="0"/>
+          </a:xfrm>
+          <a:prstGeom prst="line">
+            <a:avLst/>
+          </a:prstGeom>
+          <a:solidFill>
+            <a:schemeClr val="accent1"/>
+          </a:solidFill>
+          <a:ln w="28575" cap="flat" cmpd="sng" algn="ctr">
+            <a:solidFill>
+              <a:srgbClr val="C00000"/>
+            </a:solidFill>
+            <a:prstDash val="dash"/>
+            <a:round/>
+            <a:headEnd type="none" w="med" len="med"/>
+            <a:tailEnd type="none" w="med" len="med"/>
+          </a:ln>
+          <a:effectLst/>
+        </p:spPr>
+      </p:cxnSp>
+      <p:cxnSp>
+        <p:nvCxnSpPr>
+          <p:cNvPr id="100" name="Straight Connector 99">
+            <a:extLst>
+              <a:ext uri="{FF2B5EF4-FFF2-40B4-BE49-F238E27FC236}">
+                <a16:creationId xmlns:a16="http://schemas.microsoft.com/office/drawing/2014/main" id="{0C0FEC01-D8AE-4B6C-AFDD-878B27F5F140}"/>
+              </a:ext>
+            </a:extLst>
+          </p:cNvPr>
+          <p:cNvCxnSpPr>
+            <a:cxnSpLocks/>
+          </p:cNvCxnSpPr>
+          <p:nvPr/>
+        </p:nvCxnSpPr>
+        <p:spPr bwMode="auto">
+          <a:xfrm flipV="1">
+            <a:off x="1288870" y="3239051"/>
+            <a:ext cx="536649" cy="361313"/>
+          </a:xfrm>
+          <a:prstGeom prst="line">
+            <a:avLst/>
+          </a:prstGeom>
+          <a:solidFill>
+            <a:schemeClr val="accent1"/>
+          </a:solidFill>
+          <a:ln w="28575" cap="flat" cmpd="sng" algn="ctr">
+            <a:solidFill>
+              <a:srgbClr val="C00000"/>
+            </a:solidFill>
+            <a:prstDash val="dash"/>
+            <a:round/>
+            <a:headEnd type="none" w="med" len="med"/>
+            <a:tailEnd type="none" w="med" len="med"/>
+          </a:ln>
+          <a:effectLst/>
+        </p:spPr>
+      </p:cxnSp>
+      <p:cxnSp>
+        <p:nvCxnSpPr>
+          <p:cNvPr id="104" name="Straight Connector 103">
+            <a:extLst>
+              <a:ext uri="{FF2B5EF4-FFF2-40B4-BE49-F238E27FC236}">
+                <a16:creationId xmlns:a16="http://schemas.microsoft.com/office/drawing/2014/main" id="{728B4C8E-1466-4FE3-AE94-F13BFAD701B1}"/>
+              </a:ext>
+            </a:extLst>
+          </p:cNvPr>
+          <p:cNvCxnSpPr>
+            <a:cxnSpLocks/>
+          </p:cNvCxnSpPr>
+          <p:nvPr/>
+        </p:nvCxnSpPr>
+        <p:spPr bwMode="auto">
+          <a:xfrm flipV="1">
+            <a:off x="1170974" y="3889195"/>
+            <a:ext cx="0" cy="337843"/>
+          </a:xfrm>
+          <a:prstGeom prst="line">
+            <a:avLst/>
+          </a:prstGeom>
+          <a:solidFill>
+            <a:schemeClr val="accent1"/>
+          </a:solidFill>
+          <a:ln w="28575" cap="flat" cmpd="sng" algn="ctr">
+            <a:solidFill>
+              <a:srgbClr val="C00000"/>
+            </a:solidFill>
+            <a:prstDash val="dash"/>
+            <a:round/>
+            <a:headEnd type="none" w="med" len="med"/>
+            <a:tailEnd type="none" w="med" len="med"/>
+          </a:ln>
+          <a:effectLst/>
+        </p:spPr>
+      </p:cxnSp>
+      <p:cxnSp>
+        <p:nvCxnSpPr>
+          <p:cNvPr id="108" name="Straight Connector 107">
+            <a:extLst>
+              <a:ext uri="{FF2B5EF4-FFF2-40B4-BE49-F238E27FC236}">
+                <a16:creationId xmlns:a16="http://schemas.microsoft.com/office/drawing/2014/main" id="{B54294F1-C89B-45D2-A243-2C2F901236C7}"/>
+              </a:ext>
+            </a:extLst>
+          </p:cNvPr>
+          <p:cNvCxnSpPr>
+            <a:cxnSpLocks/>
+          </p:cNvCxnSpPr>
+          <p:nvPr/>
+        </p:nvCxnSpPr>
+        <p:spPr bwMode="auto">
+          <a:xfrm>
+            <a:off x="3413810" y="3902036"/>
+            <a:ext cx="0" cy="325002"/>
+          </a:xfrm>
+          <a:prstGeom prst="line">
+            <a:avLst/>
+          </a:prstGeom>
+          <a:solidFill>
+            <a:schemeClr val="accent1"/>
+          </a:solidFill>
+          <a:ln w="28575" cap="flat" cmpd="sng" algn="ctr">
+            <a:solidFill>
+              <a:srgbClr val="C00000"/>
+            </a:solidFill>
+            <a:prstDash val="dash"/>
+            <a:round/>
+            <a:headEnd type="none" w="med" len="med"/>
+            <a:tailEnd type="none" w="med" len="med"/>
+          </a:ln>
+          <a:effectLst/>
+        </p:spPr>
+      </p:cxnSp>
+      <p:cxnSp>
+        <p:nvCxnSpPr>
+          <p:cNvPr id="111" name="Straight Connector 110">
+            <a:extLst>
+              <a:ext uri="{FF2B5EF4-FFF2-40B4-BE49-F238E27FC236}">
+                <a16:creationId xmlns:a16="http://schemas.microsoft.com/office/drawing/2014/main" id="{2751CDB6-0ABC-47BC-A452-08CB4690B1F8}"/>
+              </a:ext>
+            </a:extLst>
+          </p:cNvPr>
+          <p:cNvCxnSpPr>
+            <a:cxnSpLocks/>
+          </p:cNvCxnSpPr>
+          <p:nvPr/>
+        </p:nvCxnSpPr>
+        <p:spPr bwMode="auto">
+          <a:xfrm flipV="1">
+            <a:off x="4167394" y="3413141"/>
+            <a:ext cx="23606" cy="846856"/>
+          </a:xfrm>
+          <a:prstGeom prst="line">
+            <a:avLst/>
+          </a:prstGeom>
+          <a:solidFill>
+            <a:schemeClr val="accent1"/>
+          </a:solidFill>
+          <a:ln w="28575" cap="flat" cmpd="sng" algn="ctr">
+            <a:solidFill>
+              <a:srgbClr val="C00000"/>
+            </a:solidFill>
+            <a:prstDash val="dash"/>
+            <a:round/>
+            <a:headEnd type="none" w="med" len="med"/>
+            <a:tailEnd type="none" w="med" len="med"/>
+          </a:ln>
+          <a:effectLst/>
+        </p:spPr>
+      </p:cxnSp>
+      <p:cxnSp>
+        <p:nvCxnSpPr>
+          <p:cNvPr id="114" name="Straight Connector 113">
+            <a:extLst>
+              <a:ext uri="{FF2B5EF4-FFF2-40B4-BE49-F238E27FC236}">
+                <a16:creationId xmlns:a16="http://schemas.microsoft.com/office/drawing/2014/main" id="{5E17958D-4234-4858-83BA-FD1B8E855986}"/>
+              </a:ext>
+            </a:extLst>
+          </p:cNvPr>
+          <p:cNvCxnSpPr>
+            <a:cxnSpLocks/>
+          </p:cNvCxnSpPr>
+          <p:nvPr/>
+        </p:nvCxnSpPr>
+        <p:spPr bwMode="auto">
+          <a:xfrm>
+            <a:off x="5640511" y="4388318"/>
+            <a:ext cx="490584" cy="0"/>
+          </a:xfrm>
+          <a:prstGeom prst="line">
+            <a:avLst/>
+          </a:prstGeom>
+          <a:solidFill>
+            <a:schemeClr val="accent1"/>
+          </a:solidFill>
+          <a:ln w="28575" cap="flat" cmpd="sng" algn="ctr">
+            <a:solidFill>
+              <a:srgbClr val="C00000"/>
+            </a:solidFill>
+            <a:prstDash val="dash"/>
+            <a:round/>
+            <a:headEnd type="none" w="med" len="med"/>
+            <a:tailEnd type="none" w="med" len="med"/>
+          </a:ln>
+          <a:effectLst/>
+        </p:spPr>
+      </p:cxnSp>
+      <p:cxnSp>
+        <p:nvCxnSpPr>
+          <p:cNvPr id="116" name="Straight Connector 115">
+            <a:extLst>
+              <a:ext uri="{FF2B5EF4-FFF2-40B4-BE49-F238E27FC236}">
+                <a16:creationId xmlns:a16="http://schemas.microsoft.com/office/drawing/2014/main" id="{786FEEBB-E471-4D98-B2DE-286540B6603E}"/>
+              </a:ext>
+            </a:extLst>
+          </p:cNvPr>
+          <p:cNvCxnSpPr>
+            <a:cxnSpLocks/>
+          </p:cNvCxnSpPr>
+          <p:nvPr/>
+        </p:nvCxnSpPr>
+        <p:spPr bwMode="auto">
+          <a:xfrm>
+            <a:off x="6362269" y="3353946"/>
+            <a:ext cx="0" cy="999350"/>
+          </a:xfrm>
+          <a:prstGeom prst="line">
+            <a:avLst/>
+          </a:prstGeom>
+          <a:solidFill>
+            <a:schemeClr val="accent1"/>
+          </a:solidFill>
+          <a:ln w="28575" cap="flat" cmpd="sng" algn="ctr">
+            <a:solidFill>
+              <a:srgbClr val="C00000"/>
+            </a:solidFill>
+            <a:prstDash val="dash"/>
+            <a:round/>
+            <a:headEnd type="none" w="med" len="med"/>
+            <a:tailEnd type="none" w="med" len="med"/>
+          </a:ln>
+          <a:effectLst/>
+        </p:spPr>
+      </p:cxnSp>
+      <p:cxnSp>
+        <p:nvCxnSpPr>
+          <p:cNvPr id="120" name="Straight Connector 119">
+            <a:extLst>
+              <a:ext uri="{FF2B5EF4-FFF2-40B4-BE49-F238E27FC236}">
+                <a16:creationId xmlns:a16="http://schemas.microsoft.com/office/drawing/2014/main" id="{1AB4D4CC-2018-4932-A6B4-72D7CAD226BA}"/>
+              </a:ext>
+            </a:extLst>
+          </p:cNvPr>
+          <p:cNvCxnSpPr>
+            <a:cxnSpLocks/>
+          </p:cNvCxnSpPr>
+          <p:nvPr/>
+        </p:nvCxnSpPr>
+        <p:spPr bwMode="auto">
+          <a:xfrm>
+            <a:off x="329624" y="7127585"/>
+            <a:ext cx="1227570" cy="0"/>
+          </a:xfrm>
+          <a:prstGeom prst="line">
+            <a:avLst/>
+          </a:prstGeom>
+          <a:solidFill>
+            <a:schemeClr val="accent1"/>
+          </a:solidFill>
+          <a:ln w="28575" cap="flat" cmpd="sng" algn="ctr">
+            <a:solidFill>
+              <a:srgbClr val="0070C0"/>
+            </a:solidFill>
+            <a:prstDash val="solid"/>
+            <a:round/>
+            <a:headEnd type="none" w="med" len="med"/>
+            <a:tailEnd type="none" w="med" len="med"/>
+          </a:ln>
+          <a:effectLst/>
+        </p:spPr>
+      </p:cxnSp>
+      <p:cxnSp>
+        <p:nvCxnSpPr>
+          <p:cNvPr id="122" name="Straight Connector 121">
+            <a:extLst>
+              <a:ext uri="{FF2B5EF4-FFF2-40B4-BE49-F238E27FC236}">
+                <a16:creationId xmlns:a16="http://schemas.microsoft.com/office/drawing/2014/main" id="{0A890F4B-89EF-47E6-9685-6A688249E6C8}"/>
+              </a:ext>
+            </a:extLst>
+          </p:cNvPr>
+          <p:cNvCxnSpPr>
+            <a:cxnSpLocks/>
+          </p:cNvCxnSpPr>
+          <p:nvPr/>
+        </p:nvCxnSpPr>
+        <p:spPr bwMode="auto">
+          <a:xfrm>
+            <a:off x="337279" y="7467600"/>
+            <a:ext cx="1219915" cy="0"/>
+          </a:xfrm>
+          <a:prstGeom prst="line">
+            <a:avLst/>
+          </a:prstGeom>
+          <a:solidFill>
+            <a:schemeClr val="accent1"/>
+          </a:solidFill>
+          <a:ln w="28575" cap="flat" cmpd="sng" algn="ctr">
+            <a:solidFill>
+              <a:srgbClr val="C00000"/>
+            </a:solidFill>
+            <a:prstDash val="dash"/>
+            <a:round/>
+            <a:headEnd type="none" w="med" len="med"/>
+            <a:tailEnd type="none" w="med" len="med"/>
+          </a:ln>
+          <a:effectLst/>
+        </p:spPr>
+      </p:cxnSp>
+      <p:sp>
+        <p:nvSpPr>
+          <p:cNvPr id="106" name="TextBox 105">
+            <a:extLst>
+              <a:ext uri="{FF2B5EF4-FFF2-40B4-BE49-F238E27FC236}">
+                <a16:creationId xmlns:a16="http://schemas.microsoft.com/office/drawing/2014/main" id="{A3DA9E8F-E3F4-4BA5-AA03-3530F191D565}"/>
+              </a:ext>
+            </a:extLst>
+          </p:cNvPr>
+          <p:cNvSpPr txBox="1"/>
+          <p:nvPr/>
+        </p:nvSpPr>
+        <p:spPr>
+          <a:xfrm>
+            <a:off x="1750060" y="7217704"/>
+            <a:ext cx="1585690" cy="461665"/>
+          </a:xfrm>
+          <a:prstGeom prst="rect">
+            <a:avLst/>
+          </a:prstGeom>
+          <a:noFill/>
+        </p:spPr>
+        <p:txBody>
+          <a:bodyPr wrap="none" rtlCol="0">
+            <a:spAutoFit/>
+          </a:bodyPr>
+          <a:lstStyle/>
+          <a:p>
+            <a:r>
+              <a:rPr lang="en-US" dirty="0"/>
+              <a:t>Considered</a:t>
+            </a:r>
+          </a:p>
+        </p:txBody>
+      </p:sp>
+      <p:sp>
+        <p:nvSpPr>
+          <p:cNvPr id="107" name="TextBox 106">
+            <a:extLst>
+              <a:ext uri="{FF2B5EF4-FFF2-40B4-BE49-F238E27FC236}">
+                <a16:creationId xmlns:a16="http://schemas.microsoft.com/office/drawing/2014/main" id="{B514D986-A8DC-4DD8-AE9C-F09AC22697D8}"/>
+              </a:ext>
+            </a:extLst>
+          </p:cNvPr>
+          <p:cNvSpPr txBox="1"/>
+          <p:nvPr/>
+        </p:nvSpPr>
+        <p:spPr>
+          <a:xfrm>
+            <a:off x="1731278" y="6860198"/>
+            <a:ext cx="2436116" cy="461665"/>
+          </a:xfrm>
+          <a:prstGeom prst="rect">
+            <a:avLst/>
+          </a:prstGeom>
+          <a:noFill/>
+        </p:spPr>
+        <p:txBody>
+          <a:bodyPr wrap="none" rtlCol="0">
+            <a:spAutoFit/>
+          </a:bodyPr>
+          <a:lstStyle/>
+          <a:p>
+            <a:r>
+              <a:rPr lang="en-US" dirty="0"/>
+              <a:t>MST Chosen Path</a:t>
+            </a:r>
+          </a:p>
+        </p:txBody>
+      </p:sp>
     </p:spTree>
   </p:cSld>
   <p:clrMapOvr>
@@ -13549,10 +14801,45 @@
       </p:sp>
       <p:cxnSp>
         <p:nvCxnSpPr>
-          <p:cNvPr id="10" name="Straight Arrow Connector 9">
+          <p:cNvPr id="3" name="Straight Connector 2">
             <a:extLst>
               <a:ext uri="{FF2B5EF4-FFF2-40B4-BE49-F238E27FC236}">
-                <a16:creationId xmlns:a16="http://schemas.microsoft.com/office/drawing/2014/main" id="{823C5D8A-6984-45B9-AFA5-C47CB1302048}"/>
+                <a16:creationId xmlns:a16="http://schemas.microsoft.com/office/drawing/2014/main" id="{9532E6A5-0074-48DF-9200-77A2BA1793AF}"/>
+              </a:ext>
+            </a:extLst>
+          </p:cNvPr>
+          <p:cNvCxnSpPr/>
+          <p:nvPr/>
+        </p:nvCxnSpPr>
+        <p:spPr bwMode="auto">
+          <a:xfrm>
+            <a:off x="1077951" y="2084658"/>
+            <a:ext cx="0" cy="1136477"/>
+          </a:xfrm>
+          <a:prstGeom prst="line">
+            <a:avLst/>
+          </a:prstGeom>
+          <a:solidFill>
+            <a:schemeClr val="accent1"/>
+          </a:solidFill>
+          <a:ln w="28575" cap="flat" cmpd="sng" algn="ctr">
+            <a:solidFill>
+              <a:srgbClr val="0070C0"/>
+            </a:solidFill>
+            <a:prstDash val="solid"/>
+            <a:round/>
+            <a:headEnd type="none" w="med" len="med"/>
+            <a:tailEnd type="none" w="med" len="med"/>
+          </a:ln>
+          <a:effectLst/>
+        </p:spPr>
+      </p:cxnSp>
+      <p:cxnSp>
+        <p:nvCxnSpPr>
+          <p:cNvPr id="6" name="Straight Connector 5">
+            <a:extLst>
+              <a:ext uri="{FF2B5EF4-FFF2-40B4-BE49-F238E27FC236}">
+                <a16:creationId xmlns:a16="http://schemas.microsoft.com/office/drawing/2014/main" id="{2EBA9352-11CF-497C-B08E-53B23B361CCD}"/>
               </a:ext>
             </a:extLst>
           </p:cNvPr>
@@ -13561,68 +14848,107 @@
         </p:nvCxnSpPr>
         <p:spPr bwMode="auto">
           <a:xfrm flipV="1">
-            <a:off x="1280764" y="2684787"/>
-            <a:ext cx="685800" cy="536348"/>
+            <a:off x="1295400" y="2667000"/>
+            <a:ext cx="704850" cy="554135"/>
           </a:xfrm>
-          <a:prstGeom prst="straightConnector1">
+          <a:prstGeom prst="line">
             <a:avLst/>
           </a:prstGeom>
           <a:solidFill>
             <a:schemeClr val="accent1"/>
           </a:solidFill>
-          <a:ln w="9525" cap="flat" cmpd="sng" algn="ctr">
+          <a:ln w="38100" cap="flat" cmpd="sng" algn="ctr">
             <a:solidFill>
               <a:srgbClr val="0070C0"/>
             </a:solidFill>
             <a:prstDash val="solid"/>
             <a:round/>
             <a:headEnd type="none" w="med" len="med"/>
-            <a:tailEnd type="triangle"/>
+            <a:tailEnd type="none" w="med" len="med"/>
           </a:ln>
           <a:effectLst/>
         </p:spPr>
       </p:cxnSp>
       <p:cxnSp>
         <p:nvCxnSpPr>
-          <p:cNvPr id="13" name="Straight Arrow Connector 12">
+          <p:cNvPr id="9" name="Straight Connector 8">
             <a:extLst>
               <a:ext uri="{FF2B5EF4-FFF2-40B4-BE49-F238E27FC236}">
-                <a16:creationId xmlns:a16="http://schemas.microsoft.com/office/drawing/2014/main" id="{6EFB2313-008A-451D-9194-A950D3832424}"/>
+                <a16:creationId xmlns:a16="http://schemas.microsoft.com/office/drawing/2014/main" id="{A0FD5FC6-6394-4141-A3B6-655BC985BFD8}"/>
               </a:ext>
             </a:extLst>
           </p:cNvPr>
-          <p:cNvCxnSpPr/>
+          <p:cNvCxnSpPr>
+            <a:cxnSpLocks/>
+          </p:cNvCxnSpPr>
           <p:nvPr/>
         </p:nvCxnSpPr>
         <p:spPr bwMode="auto">
           <a:xfrm flipV="1">
-            <a:off x="2362200" y="1963846"/>
-            <a:ext cx="609600" cy="450393"/>
+            <a:off x="2362200" y="1981200"/>
+            <a:ext cx="685800" cy="457200"/>
           </a:xfrm>
-          <a:prstGeom prst="straightConnector1">
+          <a:prstGeom prst="line">
             <a:avLst/>
           </a:prstGeom>
           <a:solidFill>
             <a:schemeClr val="accent1"/>
           </a:solidFill>
-          <a:ln w="9525" cap="flat" cmpd="sng" algn="ctr">
+          <a:ln w="28575" cap="flat" cmpd="sng" algn="ctr">
             <a:solidFill>
               <a:srgbClr val="0070C0"/>
             </a:solidFill>
             <a:prstDash val="solid"/>
             <a:round/>
             <a:headEnd type="none" w="med" len="med"/>
-            <a:tailEnd type="triangle"/>
+            <a:tailEnd type="none" w="med" len="med"/>
           </a:ln>
           <a:effectLst/>
         </p:spPr>
       </p:cxnSp>
       <p:cxnSp>
         <p:nvCxnSpPr>
-          <p:cNvPr id="15" name="Straight Arrow Connector 14">
+          <p:cNvPr id="16" name="Straight Connector 15">
             <a:extLst>
               <a:ext uri="{FF2B5EF4-FFF2-40B4-BE49-F238E27FC236}">
-                <a16:creationId xmlns:a16="http://schemas.microsoft.com/office/drawing/2014/main" id="{F4E18207-5CFF-4264-8BDA-1112C7205B56}"/>
+                <a16:creationId xmlns:a16="http://schemas.microsoft.com/office/drawing/2014/main" id="{FDCDBBDB-9ECC-41EF-A0FD-4DE4067D6934}"/>
+              </a:ext>
+            </a:extLst>
+          </p:cNvPr>
+          <p:cNvCxnSpPr>
+            <a:cxnSpLocks/>
+          </p:cNvCxnSpPr>
+          <p:nvPr/>
+        </p:nvCxnSpPr>
+        <p:spPr bwMode="auto">
+          <a:xfrm>
+            <a:off x="2133600" y="2819400"/>
+            <a:ext cx="0" cy="533400"/>
+          </a:xfrm>
+          <a:prstGeom prst="line">
+            <a:avLst/>
+          </a:prstGeom>
+          <a:solidFill>
+            <a:schemeClr val="accent1"/>
+          </a:solidFill>
+          <a:ln w="28575" cap="flat" cmpd="sng" algn="ctr">
+            <a:solidFill>
+              <a:srgbClr val="0070C0"/>
+            </a:solidFill>
+            <a:prstDash val="solid"/>
+            <a:round/>
+            <a:headEnd type="none" w="med" len="med"/>
+            <a:tailEnd type="none" w="med" len="med"/>
+          </a:ln>
+          <a:effectLst/>
+        </p:spPr>
+      </p:cxnSp>
+      <p:cxnSp>
+        <p:nvCxnSpPr>
+          <p:cNvPr id="22" name="Straight Connector 21">
+            <a:extLst>
+              <a:ext uri="{FF2B5EF4-FFF2-40B4-BE49-F238E27FC236}">
+                <a16:creationId xmlns:a16="http://schemas.microsoft.com/office/drawing/2014/main" id="{F8FD801C-9F74-42A1-B3B2-ED24967BEE89}"/>
               </a:ext>
             </a:extLst>
           </p:cNvPr>
@@ -13631,93 +14957,23 @@
         </p:nvCxnSpPr>
         <p:spPr bwMode="auto">
           <a:xfrm>
-            <a:off x="1081668" y="2140123"/>
-            <a:ext cx="0" cy="1047858"/>
+            <a:off x="3352800" y="2084658"/>
+            <a:ext cx="0" cy="1136477"/>
           </a:xfrm>
-          <a:prstGeom prst="straightConnector1">
+          <a:prstGeom prst="line">
             <a:avLst/>
           </a:prstGeom>
           <a:solidFill>
             <a:schemeClr val="accent1"/>
           </a:solidFill>
-          <a:ln w="9525" cap="flat" cmpd="sng" algn="ctr">
+          <a:ln w="28575" cap="flat" cmpd="sng" algn="ctr">
             <a:solidFill>
               <a:srgbClr val="0070C0"/>
             </a:solidFill>
             <a:prstDash val="solid"/>
             <a:round/>
             <a:headEnd type="none" w="med" len="med"/>
-            <a:tailEnd type="triangle"/>
-          </a:ln>
-          <a:effectLst/>
-        </p:spPr>
-      </p:cxnSp>
-      <p:cxnSp>
-        <p:nvCxnSpPr>
-          <p:cNvPr id="17" name="Straight Arrow Connector 16">
-            <a:extLst>
-              <a:ext uri="{FF2B5EF4-FFF2-40B4-BE49-F238E27FC236}">
-                <a16:creationId xmlns:a16="http://schemas.microsoft.com/office/drawing/2014/main" id="{27CF10F0-B5B5-4E78-96F8-F2EF7B3B8081}"/>
-              </a:ext>
-            </a:extLst>
-          </p:cNvPr>
-          <p:cNvCxnSpPr/>
-          <p:nvPr/>
-        </p:nvCxnSpPr>
-        <p:spPr bwMode="auto">
-          <a:xfrm>
-            <a:off x="2362200" y="2874391"/>
-            <a:ext cx="0" cy="402209"/>
-          </a:xfrm>
-          <a:prstGeom prst="straightConnector1">
-            <a:avLst/>
-          </a:prstGeom>
-          <a:solidFill>
-            <a:schemeClr val="accent1"/>
-          </a:solidFill>
-          <a:ln w="9525" cap="flat" cmpd="sng" algn="ctr">
-            <a:solidFill>
-              <a:srgbClr val="0070C0"/>
-            </a:solidFill>
-            <a:prstDash val="solid"/>
-            <a:round/>
-            <a:headEnd type="none" w="med" len="med"/>
-            <a:tailEnd type="triangle"/>
-          </a:ln>
-          <a:effectLst/>
-        </p:spPr>
-      </p:cxnSp>
-      <p:cxnSp>
-        <p:nvCxnSpPr>
-          <p:cNvPr id="19" name="Straight Arrow Connector 18">
-            <a:extLst>
-              <a:ext uri="{FF2B5EF4-FFF2-40B4-BE49-F238E27FC236}">
-                <a16:creationId xmlns:a16="http://schemas.microsoft.com/office/drawing/2014/main" id="{CA2F8260-8256-4B97-B22C-E57D7DB62329}"/>
-              </a:ext>
-            </a:extLst>
-          </p:cNvPr>
-          <p:cNvCxnSpPr/>
-          <p:nvPr/>
-        </p:nvCxnSpPr>
-        <p:spPr bwMode="auto">
-          <a:xfrm>
-            <a:off x="3403027" y="2140123"/>
-            <a:ext cx="0" cy="1081012"/>
-          </a:xfrm>
-          <a:prstGeom prst="straightConnector1">
-            <a:avLst/>
-          </a:prstGeom>
-          <a:solidFill>
-            <a:schemeClr val="accent1"/>
-          </a:solidFill>
-          <a:ln w="9525" cap="flat" cmpd="sng" algn="ctr">
-            <a:solidFill>
-              <a:srgbClr val="0070C0"/>
-            </a:solidFill>
-            <a:prstDash val="solid"/>
-            <a:round/>
-            <a:headEnd type="none" w="med" len="med"/>
-            <a:tailEnd type="triangle"/>
+            <a:tailEnd type="none" w="med" len="med"/>
           </a:ln>
           <a:effectLst/>
         </p:spPr>
@@ -14009,80 +15265,84 @@
       </p:sp>
       <p:cxnSp>
         <p:nvCxnSpPr>
-          <p:cNvPr id="3" name="Straight Arrow Connector 2">
+          <p:cNvPr id="4" name="Straight Connector 3">
             <a:extLst>
               <a:ext uri="{FF2B5EF4-FFF2-40B4-BE49-F238E27FC236}">
-                <a16:creationId xmlns:a16="http://schemas.microsoft.com/office/drawing/2014/main" id="{9EB7A439-74BF-44D3-AABD-A7FC2A147F45}"/>
+                <a16:creationId xmlns:a16="http://schemas.microsoft.com/office/drawing/2014/main" id="{C4C59DA1-E778-4E95-978B-2F3388021A8B}"/>
               </a:ext>
             </a:extLst>
           </p:cNvPr>
-          <p:cNvCxnSpPr/>
+          <p:cNvCxnSpPr>
+            <a:cxnSpLocks/>
+          </p:cNvCxnSpPr>
           <p:nvPr/>
         </p:nvCxnSpPr>
         <p:spPr bwMode="auto">
           <a:xfrm flipH="1">
-            <a:off x="1905000" y="1981200"/>
-            <a:ext cx="381000" cy="1066800"/>
+            <a:off x="1864578" y="1965402"/>
+            <a:ext cx="438149" cy="1215032"/>
           </a:xfrm>
-          <a:prstGeom prst="straightConnector1">
+          <a:prstGeom prst="line">
             <a:avLst/>
           </a:prstGeom>
           <a:solidFill>
             <a:schemeClr val="accent1"/>
           </a:solidFill>
-          <a:ln w="9525" cap="flat" cmpd="sng" algn="ctr">
+          <a:ln w="28575" cap="flat" cmpd="sng" algn="ctr">
             <a:solidFill>
               <a:srgbClr val="0070C0"/>
             </a:solidFill>
             <a:prstDash val="solid"/>
             <a:round/>
             <a:headEnd type="none" w="med" len="med"/>
-            <a:tailEnd type="triangle"/>
+            <a:tailEnd type="none" w="med" len="med"/>
           </a:ln>
           <a:effectLst/>
         </p:spPr>
       </p:cxnSp>
       <p:cxnSp>
         <p:nvCxnSpPr>
-          <p:cNvPr id="5" name="Straight Arrow Connector 4">
+          <p:cNvPr id="8" name="Straight Connector 7">
             <a:extLst>
               <a:ext uri="{FF2B5EF4-FFF2-40B4-BE49-F238E27FC236}">
-                <a16:creationId xmlns:a16="http://schemas.microsoft.com/office/drawing/2014/main" id="{5F53D6EE-315F-4F31-8249-EFAF606A705B}"/>
+                <a16:creationId xmlns:a16="http://schemas.microsoft.com/office/drawing/2014/main" id="{09A7ED7A-8293-44E7-A107-650F38E4B4B0}"/>
               </a:ext>
             </a:extLst>
           </p:cNvPr>
-          <p:cNvCxnSpPr/>
+          <p:cNvCxnSpPr>
+            <a:cxnSpLocks/>
+          </p:cNvCxnSpPr>
           <p:nvPr/>
         </p:nvCxnSpPr>
         <p:spPr bwMode="auto">
           <a:xfrm>
-            <a:off x="2590800" y="1905000"/>
-            <a:ext cx="1028700" cy="990600"/>
+            <a:off x="2533649" y="1943100"/>
+            <a:ext cx="1085851" cy="1028700"/>
           </a:xfrm>
-          <a:prstGeom prst="straightConnector1">
+          <a:prstGeom prst="line">
             <a:avLst/>
           </a:prstGeom>
           <a:solidFill>
             <a:schemeClr val="accent1"/>
           </a:solidFill>
-          <a:ln w="9525" cap="flat" cmpd="sng" algn="ctr">
+          <a:ln w="28575" cap="flat" cmpd="sng" algn="ctr">
             <a:solidFill>
               <a:srgbClr val="0070C0"/>
             </a:solidFill>
             <a:prstDash val="solid"/>
             <a:round/>
             <a:headEnd type="none" w="med" len="med"/>
-            <a:tailEnd type="triangle"/>
+            <a:tailEnd type="none" w="med" len="med"/>
           </a:ln>
           <a:effectLst/>
         </p:spPr>
       </p:cxnSp>
       <p:cxnSp>
         <p:nvCxnSpPr>
-          <p:cNvPr id="7" name="Straight Arrow Connector 6">
+          <p:cNvPr id="10" name="Straight Connector 9">
             <a:extLst>
               <a:ext uri="{FF2B5EF4-FFF2-40B4-BE49-F238E27FC236}">
-                <a16:creationId xmlns:a16="http://schemas.microsoft.com/office/drawing/2014/main" id="{CDE15101-EF05-4BB9-B263-785BE9BC6A35}"/>
+                <a16:creationId xmlns:a16="http://schemas.microsoft.com/office/drawing/2014/main" id="{BFA849D3-61AB-457D-8C49-F70EC440A5F6}"/>
               </a:ext>
             </a:extLst>
           </p:cNvPr>
@@ -14091,128 +15351,134 @@
         </p:nvCxnSpPr>
         <p:spPr bwMode="auto">
           <a:xfrm flipV="1">
-            <a:off x="3733800" y="2895600"/>
-            <a:ext cx="381000" cy="76200"/>
+            <a:off x="3665963" y="2933700"/>
+            <a:ext cx="457200" cy="76200"/>
           </a:xfrm>
-          <a:prstGeom prst="straightConnector1">
+          <a:prstGeom prst="line">
             <a:avLst/>
           </a:prstGeom>
           <a:solidFill>
             <a:schemeClr val="accent1"/>
           </a:solidFill>
-          <a:ln w="9525" cap="flat" cmpd="sng" algn="ctr">
+          <a:ln w="28575" cap="flat" cmpd="sng" algn="ctr">
             <a:solidFill>
               <a:srgbClr val="0070C0"/>
             </a:solidFill>
             <a:prstDash val="solid"/>
             <a:round/>
             <a:headEnd type="none" w="med" len="med"/>
-            <a:tailEnd type="triangle"/>
+            <a:tailEnd type="none" w="med" len="med"/>
           </a:ln>
           <a:effectLst/>
         </p:spPr>
       </p:cxnSp>
       <p:cxnSp>
         <p:nvCxnSpPr>
-          <p:cNvPr id="11" name="Straight Arrow Connector 10">
+          <p:cNvPr id="14" name="Straight Connector 13">
             <a:extLst>
               <a:ext uri="{FF2B5EF4-FFF2-40B4-BE49-F238E27FC236}">
-                <a16:creationId xmlns:a16="http://schemas.microsoft.com/office/drawing/2014/main" id="{7FE0C908-1D6F-4D15-97AC-89A8DA03FCB5}"/>
+                <a16:creationId xmlns:a16="http://schemas.microsoft.com/office/drawing/2014/main" id="{0D945E85-9E69-4392-A7F6-2D9F0A46F906}"/>
               </a:ext>
             </a:extLst>
           </p:cNvPr>
-          <p:cNvCxnSpPr/>
+          <p:cNvCxnSpPr>
+            <a:cxnSpLocks/>
+          </p:cNvCxnSpPr>
           <p:nvPr/>
         </p:nvCxnSpPr>
         <p:spPr bwMode="auto">
           <a:xfrm>
-            <a:off x="4343400" y="3048000"/>
-            <a:ext cx="76200" cy="533400"/>
+            <a:off x="4343401" y="3124200"/>
+            <a:ext cx="76200" cy="482797"/>
           </a:xfrm>
-          <a:prstGeom prst="straightConnector1">
+          <a:prstGeom prst="line">
             <a:avLst/>
           </a:prstGeom>
           <a:solidFill>
             <a:schemeClr val="accent1"/>
           </a:solidFill>
-          <a:ln w="9525" cap="flat" cmpd="sng" algn="ctr">
+          <a:ln w="28575" cap="flat" cmpd="sng" algn="ctr">
             <a:solidFill>
               <a:srgbClr val="0070C0"/>
             </a:solidFill>
             <a:prstDash val="solid"/>
             <a:round/>
             <a:headEnd type="none" w="med" len="med"/>
-            <a:tailEnd type="triangle"/>
+            <a:tailEnd type="none" w="med" len="med"/>
           </a:ln>
           <a:effectLst/>
         </p:spPr>
       </p:cxnSp>
       <p:cxnSp>
         <p:nvCxnSpPr>
-          <p:cNvPr id="13" name="Straight Arrow Connector 12">
+          <p:cNvPr id="17" name="Straight Connector 16">
             <a:extLst>
               <a:ext uri="{FF2B5EF4-FFF2-40B4-BE49-F238E27FC236}">
-                <a16:creationId xmlns:a16="http://schemas.microsoft.com/office/drawing/2014/main" id="{52AD4741-FFF9-450F-87F4-78F08EC8CEE0}"/>
+                <a16:creationId xmlns:a16="http://schemas.microsoft.com/office/drawing/2014/main" id="{BAE38AA1-49F9-4AE2-94B9-B02C7C8A0CD9}"/>
               </a:ext>
             </a:extLst>
           </p:cNvPr>
-          <p:cNvCxnSpPr/>
+          <p:cNvCxnSpPr>
+            <a:cxnSpLocks/>
+          </p:cNvCxnSpPr>
           <p:nvPr/>
         </p:nvCxnSpPr>
         <p:spPr bwMode="auto">
-          <a:xfrm flipH="1">
-            <a:off x="3200400" y="3733800"/>
-            <a:ext cx="990600" cy="838200"/>
+          <a:xfrm flipV="1">
+            <a:off x="4523680" y="3124200"/>
+            <a:ext cx="1267520" cy="469998"/>
           </a:xfrm>
-          <a:prstGeom prst="straightConnector1">
+          <a:prstGeom prst="line">
             <a:avLst/>
           </a:prstGeom>
           <a:solidFill>
             <a:schemeClr val="accent1"/>
           </a:solidFill>
-          <a:ln w="9525" cap="flat" cmpd="sng" algn="ctr">
+          <a:ln w="28575" cap="flat" cmpd="sng" algn="ctr">
             <a:solidFill>
               <a:srgbClr val="0070C0"/>
             </a:solidFill>
             <a:prstDash val="solid"/>
             <a:round/>
             <a:headEnd type="none" w="med" len="med"/>
-            <a:tailEnd type="triangle"/>
+            <a:tailEnd type="none" w="med" len="med"/>
           </a:ln>
           <a:effectLst/>
         </p:spPr>
       </p:cxnSp>
       <p:cxnSp>
         <p:nvCxnSpPr>
-          <p:cNvPr id="15" name="Straight Arrow Connector 14">
+          <p:cNvPr id="19" name="Straight Connector 18">
             <a:extLst>
               <a:ext uri="{FF2B5EF4-FFF2-40B4-BE49-F238E27FC236}">
-                <a16:creationId xmlns:a16="http://schemas.microsoft.com/office/drawing/2014/main" id="{83F8E033-0EB2-4308-B68A-206801F49EBE}"/>
+                <a16:creationId xmlns:a16="http://schemas.microsoft.com/office/drawing/2014/main" id="{E228AA20-5D3B-4915-8BA0-89A1880EEB82}"/>
               </a:ext>
             </a:extLst>
           </p:cNvPr>
-          <p:cNvCxnSpPr/>
+          <p:cNvCxnSpPr>
+            <a:cxnSpLocks/>
+          </p:cNvCxnSpPr>
           <p:nvPr/>
         </p:nvCxnSpPr>
         <p:spPr bwMode="auto">
-          <a:xfrm flipV="1">
-            <a:off x="4495800" y="3048000"/>
-            <a:ext cx="1295400" cy="525065"/>
+          <a:xfrm flipH="1">
+            <a:off x="3124201" y="3733800"/>
+            <a:ext cx="1142999" cy="952500"/>
           </a:xfrm>
-          <a:prstGeom prst="straightConnector1">
+          <a:prstGeom prst="line">
             <a:avLst/>
           </a:prstGeom>
           <a:solidFill>
             <a:schemeClr val="accent1"/>
           </a:solidFill>
-          <a:ln w="9525" cap="flat" cmpd="sng" algn="ctr">
+          <a:ln w="28575" cap="flat" cmpd="sng" algn="ctr">
             <a:solidFill>
               <a:srgbClr val="0070C0"/>
             </a:solidFill>
             <a:prstDash val="solid"/>
             <a:round/>
             <a:headEnd type="none" w="med" len="med"/>
-            <a:tailEnd type="triangle"/>
+            <a:tailEnd type="none" w="med" len="med"/>
           </a:ln>
           <a:effectLst/>
         </p:spPr>

</xml_diff>